<commit_message>
11-5-2019 Final Documentation Updates
</commit_message>
<xml_diff>
--- a/prj/hazelnut_large/LHC-001/1-Documentation/2019-10-24 LED Coolant Line Routing Designs/2019-10-30 Fluid Line Routing Details.pptx
+++ b/prj/hazelnut_large/LHC-001/1-Documentation/2019-10-24 LED Coolant Line Routing Designs/2019-10-30 Fluid Line Routing Details.pptx
@@ -5,13 +5,12 @@
     <p:sldMasterId id="2147483708" r:id="rId1"/>
   </p:sldMasterIdLst>
   <p:notesMasterIdLst>
-    <p:notesMasterId r:id="rId6"/>
+    <p:notesMasterId r:id="rId5"/>
   </p:notesMasterIdLst>
   <p:sldIdLst>
     <p:sldId id="264" r:id="rId2"/>
     <p:sldId id="256" r:id="rId3"/>
     <p:sldId id="266" r:id="rId4"/>
-    <p:sldId id="265" r:id="rId5"/>
   </p:sldIdLst>
   <p:sldSz cx="13411200" cy="10058400"/>
   <p:notesSz cx="7315200" cy="9601200"/>
@@ -3554,7 +3553,7 @@
             </a:pPr>
             <a:r>
               <a:rPr lang="en-US" dirty="0"/>
-              <a:t>Tree pallet layout and suggested fluid line routing</a:t>
+              <a:t>Tree pallet layout and suggested fluid line routing for the Tree Heater Assembly</a:t>
             </a:r>
           </a:p>
         </p:txBody>
@@ -4308,6 +4307,184 @@
           </a:fontRef>
         </p:style>
       </p:cxnSp>
+      <p:sp>
+        <p:nvSpPr>
+          <p:cNvPr id="2" name="Rectangle 1">
+            <a:extLst>
+              <a:ext uri="{FF2B5EF4-FFF2-40B4-BE49-F238E27FC236}">
+                <a16:creationId xmlns:a16="http://schemas.microsoft.com/office/drawing/2014/main" id="{AB899806-331C-493E-833D-7CDCA4645942}"/>
+              </a:ext>
+            </a:extLst>
+          </p:cNvPr>
+          <p:cNvSpPr/>
+          <p:nvPr/>
+        </p:nvSpPr>
+        <p:spPr>
+          <a:xfrm>
+            <a:off x="8674671" y="7476320"/>
+            <a:ext cx="339267" cy="339047"/>
+          </a:xfrm>
+          <a:prstGeom prst="rect">
+            <a:avLst/>
+          </a:prstGeom>
+          <a:solidFill>
+            <a:srgbClr val="FF0000"/>
+          </a:solidFill>
+          <a:ln w="38100">
+            <a:solidFill>
+              <a:schemeClr val="tx1"/>
+            </a:solidFill>
+          </a:ln>
+        </p:spPr>
+        <p:style>
+          <a:lnRef idx="2">
+            <a:schemeClr val="accent1">
+              <a:shade val="50000"/>
+            </a:schemeClr>
+          </a:lnRef>
+          <a:fillRef idx="1">
+            <a:schemeClr val="accent1"/>
+          </a:fillRef>
+          <a:effectRef idx="0">
+            <a:schemeClr val="accent1"/>
+          </a:effectRef>
+          <a:fontRef idx="minor">
+            <a:schemeClr val="lt1"/>
+          </a:fontRef>
+        </p:style>
+        <p:txBody>
+          <a:bodyPr rtlCol="0" anchor="ctr"/>
+          <a:lstStyle/>
+          <a:p>
+            <a:pPr algn="ctr"/>
+            <a:endParaRPr lang="en-US"/>
+          </a:p>
+        </p:txBody>
+      </p:sp>
+      <p:sp>
+        <p:nvSpPr>
+          <p:cNvPr id="22" name="Rectangle 21">
+            <a:extLst>
+              <a:ext uri="{FF2B5EF4-FFF2-40B4-BE49-F238E27FC236}">
+                <a16:creationId xmlns:a16="http://schemas.microsoft.com/office/drawing/2014/main" id="{74D2ECAC-7362-4D2A-8D5A-14BBB063CEF7}"/>
+              </a:ext>
+            </a:extLst>
+          </p:cNvPr>
+          <p:cNvSpPr/>
+          <p:nvPr/>
+        </p:nvSpPr>
+        <p:spPr>
+          <a:xfrm>
+            <a:off x="8674670" y="8083560"/>
+            <a:ext cx="339267" cy="339047"/>
+          </a:xfrm>
+          <a:prstGeom prst="rect">
+            <a:avLst/>
+          </a:prstGeom>
+          <a:solidFill>
+            <a:srgbClr val="00B0F0"/>
+          </a:solidFill>
+          <a:ln w="38100">
+            <a:solidFill>
+              <a:schemeClr val="tx1"/>
+            </a:solidFill>
+          </a:ln>
+        </p:spPr>
+        <p:style>
+          <a:lnRef idx="2">
+            <a:schemeClr val="accent1">
+              <a:shade val="50000"/>
+            </a:schemeClr>
+          </a:lnRef>
+          <a:fillRef idx="1">
+            <a:schemeClr val="accent1"/>
+          </a:fillRef>
+          <a:effectRef idx="0">
+            <a:schemeClr val="accent1"/>
+          </a:effectRef>
+          <a:fontRef idx="minor">
+            <a:schemeClr val="lt1"/>
+          </a:fontRef>
+        </p:style>
+        <p:txBody>
+          <a:bodyPr rtlCol="0" anchor="ctr"/>
+          <a:lstStyle/>
+          <a:p>
+            <a:pPr algn="ctr"/>
+            <a:endParaRPr lang="en-US"/>
+          </a:p>
+        </p:txBody>
+      </p:sp>
+      <p:sp>
+        <p:nvSpPr>
+          <p:cNvPr id="23" name="TextBox 22">
+            <a:extLst>
+              <a:ext uri="{FF2B5EF4-FFF2-40B4-BE49-F238E27FC236}">
+                <a16:creationId xmlns:a16="http://schemas.microsoft.com/office/drawing/2014/main" id="{A61D1223-AD86-4E9F-8DA3-29DDF37A8006}"/>
+              </a:ext>
+            </a:extLst>
+          </p:cNvPr>
+          <p:cNvSpPr txBox="1"/>
+          <p:nvPr/>
+        </p:nvSpPr>
+        <p:spPr>
+          <a:xfrm>
+            <a:off x="9013937" y="7415010"/>
+            <a:ext cx="3084341" cy="461665"/>
+          </a:xfrm>
+          <a:prstGeom prst="rect">
+            <a:avLst/>
+          </a:prstGeom>
+          <a:noFill/>
+        </p:spPr>
+        <p:txBody>
+          <a:bodyPr wrap="square" rtlCol="0">
+            <a:spAutoFit/>
+          </a:bodyPr>
+          <a:lstStyle/>
+          <a:p>
+            <a:r>
+              <a:rPr lang="en-US" sz="2400" dirty="0"/>
+              <a:t>Fluid to Tree Heater</a:t>
+            </a:r>
+          </a:p>
+        </p:txBody>
+      </p:sp>
+      <p:sp>
+        <p:nvSpPr>
+          <p:cNvPr id="26" name="TextBox 25">
+            <a:extLst>
+              <a:ext uri="{FF2B5EF4-FFF2-40B4-BE49-F238E27FC236}">
+                <a16:creationId xmlns:a16="http://schemas.microsoft.com/office/drawing/2014/main" id="{3CEA2F8C-505D-4A44-9BAC-DF46FE176E9F}"/>
+              </a:ext>
+            </a:extLst>
+          </p:cNvPr>
+          <p:cNvSpPr txBox="1"/>
+          <p:nvPr/>
+        </p:nvSpPr>
+        <p:spPr>
+          <a:xfrm>
+            <a:off x="9013937" y="7973085"/>
+            <a:ext cx="3084337" cy="461665"/>
+          </a:xfrm>
+          <a:prstGeom prst="rect">
+            <a:avLst/>
+          </a:prstGeom>
+          <a:noFill/>
+        </p:spPr>
+        <p:txBody>
+          <a:bodyPr wrap="square" rtlCol="0">
+            <a:spAutoFit/>
+          </a:bodyPr>
+          <a:lstStyle/>
+          <a:p>
+            <a:r>
+              <a:rPr lang="en-US" sz="2400" dirty="0"/>
+              <a:t>Fluid from Tree Heater</a:t>
+            </a:r>
+          </a:p>
+        </p:txBody>
+      </p:sp>
     </p:spTree>
     <p:extLst>
       <p:ext uri="{BB962C8B-B14F-4D97-AF65-F5344CB8AC3E}">
@@ -4338,6 +4515,399 @@
           <a:chExt cx="0" cy="0"/>
         </a:xfrm>
       </p:grpSpPr>
+      <p:cxnSp>
+        <p:nvCxnSpPr>
+          <p:cNvPr id="173" name="Straight Arrow Connector 172">
+            <a:extLst>
+              <a:ext uri="{FF2B5EF4-FFF2-40B4-BE49-F238E27FC236}">
+                <a16:creationId xmlns:a16="http://schemas.microsoft.com/office/drawing/2014/main" id="{4F9148CC-A7C1-4804-88B8-4A512F785322}"/>
+              </a:ext>
+            </a:extLst>
+          </p:cNvPr>
+          <p:cNvCxnSpPr>
+            <a:cxnSpLocks/>
+          </p:cNvCxnSpPr>
+          <p:nvPr/>
+        </p:nvCxnSpPr>
+        <p:spPr>
+          <a:xfrm>
+            <a:off x="2862536" y="3594676"/>
+            <a:ext cx="514959" cy="501057"/>
+          </a:xfrm>
+          <a:prstGeom prst="straightConnector1">
+            <a:avLst/>
+          </a:prstGeom>
+          <a:ln w="57150">
+            <a:solidFill>
+              <a:srgbClr val="00B0F0"/>
+            </a:solidFill>
+            <a:tailEnd type="triangle" w="med" len="med"/>
+          </a:ln>
+        </p:spPr>
+        <p:style>
+          <a:lnRef idx="1">
+            <a:schemeClr val="accent1"/>
+          </a:lnRef>
+          <a:fillRef idx="0">
+            <a:schemeClr val="accent1"/>
+          </a:fillRef>
+          <a:effectRef idx="0">
+            <a:schemeClr val="accent1"/>
+          </a:effectRef>
+          <a:fontRef idx="minor">
+            <a:schemeClr val="tx1"/>
+          </a:fontRef>
+        </p:style>
+      </p:cxnSp>
+      <p:cxnSp>
+        <p:nvCxnSpPr>
+          <p:cNvPr id="160" name="Straight Connector 159">
+            <a:extLst>
+              <a:ext uri="{FF2B5EF4-FFF2-40B4-BE49-F238E27FC236}">
+                <a16:creationId xmlns:a16="http://schemas.microsoft.com/office/drawing/2014/main" id="{3FD8C0EB-EBA6-45DF-9F88-0C3F7A109EDE}"/>
+              </a:ext>
+            </a:extLst>
+          </p:cNvPr>
+          <p:cNvCxnSpPr>
+            <a:cxnSpLocks/>
+          </p:cNvCxnSpPr>
+          <p:nvPr/>
+        </p:nvCxnSpPr>
+        <p:spPr>
+          <a:xfrm flipH="1" flipV="1">
+            <a:off x="2279151" y="330711"/>
+            <a:ext cx="1100215" cy="931646"/>
+          </a:xfrm>
+          <a:prstGeom prst="line">
+            <a:avLst/>
+          </a:prstGeom>
+          <a:ln w="57150">
+            <a:solidFill>
+              <a:srgbClr val="FF0000"/>
+            </a:solidFill>
+            <a:prstDash val="sysDash"/>
+          </a:ln>
+        </p:spPr>
+        <p:style>
+          <a:lnRef idx="1">
+            <a:schemeClr val="accent1"/>
+          </a:lnRef>
+          <a:fillRef idx="0">
+            <a:schemeClr val="accent1"/>
+          </a:fillRef>
+          <a:effectRef idx="0">
+            <a:schemeClr val="accent1"/>
+          </a:effectRef>
+          <a:fontRef idx="minor">
+            <a:schemeClr val="tx1"/>
+          </a:fontRef>
+        </p:style>
+      </p:cxnSp>
+      <p:cxnSp>
+        <p:nvCxnSpPr>
+          <p:cNvPr id="127" name="Straight Arrow Connector 126">
+            <a:extLst>
+              <a:ext uri="{FF2B5EF4-FFF2-40B4-BE49-F238E27FC236}">
+                <a16:creationId xmlns:a16="http://schemas.microsoft.com/office/drawing/2014/main" id="{48F884F4-0482-46FC-BC6E-187F0A377044}"/>
+              </a:ext>
+            </a:extLst>
+          </p:cNvPr>
+          <p:cNvCxnSpPr>
+            <a:cxnSpLocks/>
+          </p:cNvCxnSpPr>
+          <p:nvPr/>
+        </p:nvCxnSpPr>
+        <p:spPr>
+          <a:xfrm flipV="1">
+            <a:off x="3730692" y="4374060"/>
+            <a:ext cx="507227" cy="244732"/>
+          </a:xfrm>
+          <a:prstGeom prst="straightConnector1">
+            <a:avLst/>
+          </a:prstGeom>
+          <a:ln w="57150">
+            <a:solidFill>
+              <a:srgbClr val="00B0F0"/>
+            </a:solidFill>
+            <a:tailEnd type="triangle" w="med" len="med"/>
+          </a:ln>
+        </p:spPr>
+        <p:style>
+          <a:lnRef idx="1">
+            <a:schemeClr val="accent1"/>
+          </a:lnRef>
+          <a:fillRef idx="0">
+            <a:schemeClr val="accent1"/>
+          </a:fillRef>
+          <a:effectRef idx="0">
+            <a:schemeClr val="accent1"/>
+          </a:effectRef>
+          <a:fontRef idx="minor">
+            <a:schemeClr val="tx1"/>
+          </a:fontRef>
+        </p:style>
+      </p:cxnSp>
+      <p:cxnSp>
+        <p:nvCxnSpPr>
+          <p:cNvPr id="123" name="Straight Arrow Connector 122">
+            <a:extLst>
+              <a:ext uri="{FF2B5EF4-FFF2-40B4-BE49-F238E27FC236}">
+                <a16:creationId xmlns:a16="http://schemas.microsoft.com/office/drawing/2014/main" id="{E5CB9AF8-327A-45E9-BC47-A9F77C559921}"/>
+              </a:ext>
+            </a:extLst>
+          </p:cNvPr>
+          <p:cNvCxnSpPr>
+            <a:cxnSpLocks/>
+          </p:cNvCxnSpPr>
+          <p:nvPr/>
+        </p:nvCxnSpPr>
+        <p:spPr>
+          <a:xfrm flipH="1">
+            <a:off x="2897446" y="4719902"/>
+            <a:ext cx="657088" cy="331577"/>
+          </a:xfrm>
+          <a:prstGeom prst="straightConnector1">
+            <a:avLst/>
+          </a:prstGeom>
+          <a:ln w="57150">
+            <a:solidFill>
+              <a:srgbClr val="00B0F0"/>
+            </a:solidFill>
+            <a:tailEnd type="triangle" w="med" len="med"/>
+          </a:ln>
+        </p:spPr>
+        <p:style>
+          <a:lnRef idx="1">
+            <a:schemeClr val="accent1"/>
+          </a:lnRef>
+          <a:fillRef idx="0">
+            <a:schemeClr val="accent1"/>
+          </a:fillRef>
+          <a:effectRef idx="0">
+            <a:schemeClr val="accent1"/>
+          </a:effectRef>
+          <a:fontRef idx="minor">
+            <a:schemeClr val="tx1"/>
+          </a:fontRef>
+        </p:style>
+      </p:cxnSp>
+      <p:cxnSp>
+        <p:nvCxnSpPr>
+          <p:cNvPr id="121" name="Straight Arrow Connector 120">
+            <a:extLst>
+              <a:ext uri="{FF2B5EF4-FFF2-40B4-BE49-F238E27FC236}">
+                <a16:creationId xmlns:a16="http://schemas.microsoft.com/office/drawing/2014/main" id="{00DDA94B-9442-4B62-A792-B64DE9DD0EEF}"/>
+              </a:ext>
+            </a:extLst>
+          </p:cNvPr>
+          <p:cNvCxnSpPr>
+            <a:cxnSpLocks/>
+          </p:cNvCxnSpPr>
+          <p:nvPr/>
+        </p:nvCxnSpPr>
+        <p:spPr>
+          <a:xfrm>
+            <a:off x="5639947" y="4276725"/>
+            <a:ext cx="582293" cy="580356"/>
+          </a:xfrm>
+          <a:prstGeom prst="straightConnector1">
+            <a:avLst/>
+          </a:prstGeom>
+          <a:ln w="57150">
+            <a:solidFill>
+              <a:srgbClr val="00B0F0"/>
+            </a:solidFill>
+            <a:tailEnd type="triangle" w="med" len="med"/>
+          </a:ln>
+        </p:spPr>
+        <p:style>
+          <a:lnRef idx="1">
+            <a:schemeClr val="accent1"/>
+          </a:lnRef>
+          <a:fillRef idx="0">
+            <a:schemeClr val="accent1"/>
+          </a:fillRef>
+          <a:effectRef idx="0">
+            <a:schemeClr val="accent1"/>
+          </a:effectRef>
+          <a:fontRef idx="minor">
+            <a:schemeClr val="tx1"/>
+          </a:fontRef>
+        </p:style>
+      </p:cxnSp>
+      <p:cxnSp>
+        <p:nvCxnSpPr>
+          <p:cNvPr id="119" name="Straight Arrow Connector 118">
+            <a:extLst>
+              <a:ext uri="{FF2B5EF4-FFF2-40B4-BE49-F238E27FC236}">
+                <a16:creationId xmlns:a16="http://schemas.microsoft.com/office/drawing/2014/main" id="{19CF9403-A258-4988-A59D-AEB8B490E870}"/>
+              </a:ext>
+            </a:extLst>
+          </p:cNvPr>
+          <p:cNvCxnSpPr>
+            <a:cxnSpLocks/>
+          </p:cNvCxnSpPr>
+          <p:nvPr/>
+        </p:nvCxnSpPr>
+        <p:spPr>
+          <a:xfrm>
+            <a:off x="6843427" y="5510898"/>
+            <a:ext cx="651803" cy="643015"/>
+          </a:xfrm>
+          <a:prstGeom prst="straightConnector1">
+            <a:avLst/>
+          </a:prstGeom>
+          <a:ln w="57150">
+            <a:solidFill>
+              <a:srgbClr val="00B0F0"/>
+            </a:solidFill>
+            <a:tailEnd type="triangle" w="med" len="med"/>
+          </a:ln>
+        </p:spPr>
+        <p:style>
+          <a:lnRef idx="1">
+            <a:schemeClr val="accent1"/>
+          </a:lnRef>
+          <a:fillRef idx="0">
+            <a:schemeClr val="accent1"/>
+          </a:fillRef>
+          <a:effectRef idx="0">
+            <a:schemeClr val="accent1"/>
+          </a:effectRef>
+          <a:fontRef idx="minor">
+            <a:schemeClr val="tx1"/>
+          </a:fontRef>
+        </p:style>
+      </p:cxnSp>
+      <p:cxnSp>
+        <p:nvCxnSpPr>
+          <p:cNvPr id="36" name="Straight Connector 35">
+            <a:extLst>
+              <a:ext uri="{FF2B5EF4-FFF2-40B4-BE49-F238E27FC236}">
+                <a16:creationId xmlns:a16="http://schemas.microsoft.com/office/drawing/2014/main" id="{8919DE64-A0BD-41EB-96E2-6C2496B80312}"/>
+              </a:ext>
+            </a:extLst>
+          </p:cNvPr>
+          <p:cNvCxnSpPr>
+            <a:cxnSpLocks/>
+          </p:cNvCxnSpPr>
+          <p:nvPr/>
+        </p:nvCxnSpPr>
+        <p:spPr>
+          <a:xfrm flipH="1" flipV="1">
+            <a:off x="5189884" y="384561"/>
+            <a:ext cx="2989474" cy="2765599"/>
+          </a:xfrm>
+          <a:prstGeom prst="line">
+            <a:avLst/>
+          </a:prstGeom>
+          <a:ln w="57150">
+            <a:solidFill>
+              <a:srgbClr val="FF0000"/>
+            </a:solidFill>
+          </a:ln>
+        </p:spPr>
+        <p:style>
+          <a:lnRef idx="1">
+            <a:schemeClr val="accent1"/>
+          </a:lnRef>
+          <a:fillRef idx="0">
+            <a:schemeClr val="accent1"/>
+          </a:fillRef>
+          <a:effectRef idx="0">
+            <a:schemeClr val="accent1"/>
+          </a:effectRef>
+          <a:fontRef idx="minor">
+            <a:schemeClr val="tx1"/>
+          </a:fontRef>
+        </p:style>
+      </p:cxnSp>
+      <p:cxnSp>
+        <p:nvCxnSpPr>
+          <p:cNvPr id="19" name="Straight Connector 18">
+            <a:extLst>
+              <a:ext uri="{FF2B5EF4-FFF2-40B4-BE49-F238E27FC236}">
+                <a16:creationId xmlns:a16="http://schemas.microsoft.com/office/drawing/2014/main" id="{EFB6B695-AB8B-40FD-8504-406AFA0CAD37}"/>
+              </a:ext>
+            </a:extLst>
+          </p:cNvPr>
+          <p:cNvCxnSpPr>
+            <a:cxnSpLocks/>
+          </p:cNvCxnSpPr>
+          <p:nvPr/>
+        </p:nvCxnSpPr>
+        <p:spPr>
+          <a:xfrm flipH="1">
+            <a:off x="1501833" y="4016326"/>
+            <a:ext cx="3688051" cy="1883127"/>
+          </a:xfrm>
+          <a:prstGeom prst="line">
+            <a:avLst/>
+          </a:prstGeom>
+          <a:ln w="57150">
+            <a:solidFill>
+              <a:srgbClr val="00B0F0"/>
+            </a:solidFill>
+          </a:ln>
+        </p:spPr>
+        <p:style>
+          <a:lnRef idx="1">
+            <a:schemeClr val="accent1"/>
+          </a:lnRef>
+          <a:fillRef idx="0">
+            <a:schemeClr val="accent1"/>
+          </a:fillRef>
+          <a:effectRef idx="0">
+            <a:schemeClr val="accent1"/>
+          </a:effectRef>
+          <a:fontRef idx="minor">
+            <a:schemeClr val="tx1"/>
+          </a:fontRef>
+        </p:style>
+      </p:cxnSp>
+      <p:cxnSp>
+        <p:nvCxnSpPr>
+          <p:cNvPr id="17" name="Straight Connector 16">
+            <a:extLst>
+              <a:ext uri="{FF2B5EF4-FFF2-40B4-BE49-F238E27FC236}">
+                <a16:creationId xmlns:a16="http://schemas.microsoft.com/office/drawing/2014/main" id="{17EDFE00-917B-45ED-9A38-E7A66E69300B}"/>
+              </a:ext>
+            </a:extLst>
+          </p:cNvPr>
+          <p:cNvCxnSpPr>
+            <a:cxnSpLocks/>
+          </p:cNvCxnSpPr>
+          <p:nvPr/>
+        </p:nvCxnSpPr>
+        <p:spPr>
+          <a:xfrm>
+            <a:off x="5189884" y="4066749"/>
+            <a:ext cx="2629642" cy="2645948"/>
+          </a:xfrm>
+          <a:prstGeom prst="line">
+            <a:avLst/>
+          </a:prstGeom>
+          <a:ln w="57150">
+            <a:solidFill>
+              <a:srgbClr val="00B0F0"/>
+            </a:solidFill>
+          </a:ln>
+        </p:spPr>
+        <p:style>
+          <a:lnRef idx="1">
+            <a:schemeClr val="accent1"/>
+          </a:lnRef>
+          <a:fillRef idx="0">
+            <a:schemeClr val="accent1"/>
+          </a:fillRef>
+          <a:effectRef idx="0">
+            <a:schemeClr val="accent1"/>
+          </a:effectRef>
+          <a:fontRef idx="minor">
+            <a:schemeClr val="tx1"/>
+          </a:fontRef>
+        </p:style>
+      </p:cxnSp>
       <p:sp>
         <p:nvSpPr>
           <p:cNvPr id="4" name="Slide Number Placeholder 3">
@@ -4367,112 +4937,12 @@
           </a:p>
         </p:txBody>
       </p:sp>
-      <p:pic>
-        <p:nvPicPr>
-          <p:cNvPr id="3" name="Picture 2">
-            <a:extLst>
-              <a:ext uri="{FF2B5EF4-FFF2-40B4-BE49-F238E27FC236}">
-                <a16:creationId xmlns:a16="http://schemas.microsoft.com/office/drawing/2014/main" id="{D8308290-0503-4499-B20D-9F1AFF0473A6}"/>
-              </a:ext>
-            </a:extLst>
-          </p:cNvPr>
-          <p:cNvPicPr>
-            <a:picLocks noChangeAspect="1"/>
-          </p:cNvPicPr>
-          <p:nvPr/>
-        </p:nvPicPr>
-        <p:blipFill rotWithShape="1">
-          <a:blip r:embed="rId2">
-            <a:extLst>
-              <a:ext uri="{28A0092B-C50C-407E-A947-70E740481C1C}">
-                <a14:useLocalDpi xmlns:a14="http://schemas.microsoft.com/office/drawing/2010/main" val="0"/>
-              </a:ext>
-            </a:extLst>
-          </a:blip>
-          <a:srcRect l="3476" t="9157" b="4111"/>
-          <a:stretch/>
-        </p:blipFill>
-        <p:spPr>
-          <a:xfrm>
-            <a:off x="3200400" y="200234"/>
-            <a:ext cx="7994275" cy="9577630"/>
-          </a:xfrm>
-          <a:prstGeom prst="rect">
-            <a:avLst/>
-          </a:prstGeom>
-        </p:spPr>
-      </p:pic>
-    </p:spTree>
-    <p:extLst>
-      <p:ext uri="{BB962C8B-B14F-4D97-AF65-F5344CB8AC3E}">
-        <p14:creationId xmlns:p14="http://schemas.microsoft.com/office/powerpoint/2010/main" val="454722824"/>
-      </p:ext>
-    </p:extLst>
-  </p:cSld>
-  <p:clrMapOvr>
-    <a:masterClrMapping/>
-  </p:clrMapOvr>
-</p:sld>
-</file>
-
-<file path=ppt/slides/slide4.xml><?xml version="1.0" encoding="utf-8"?>
-<p:sld xmlns:a="http://schemas.openxmlformats.org/drawingml/2006/main" xmlns:r="http://schemas.openxmlformats.org/officeDocument/2006/relationships" xmlns:p="http://schemas.openxmlformats.org/presentationml/2006/main">
-  <p:cSld>
-    <p:spTree>
-      <p:nvGrpSpPr>
-        <p:cNvPr id="1" name=""/>
-        <p:cNvGrpSpPr/>
-        <p:nvPr/>
-      </p:nvGrpSpPr>
-      <p:grpSpPr>
-        <a:xfrm>
-          <a:off x="0" y="0"/>
-          <a:ext cx="0" cy="0"/>
-          <a:chOff x="0" y="0"/>
-          <a:chExt cx="0" cy="0"/>
-        </a:xfrm>
-      </p:grpSpPr>
-      <p:pic>
-        <p:nvPicPr>
-          <p:cNvPr id="3" name="Picture 2">
-            <a:extLst>
-              <a:ext uri="{FF2B5EF4-FFF2-40B4-BE49-F238E27FC236}">
-                <a16:creationId xmlns:a16="http://schemas.microsoft.com/office/drawing/2014/main" id="{6E6442F1-6ADF-4B71-8F9B-AFDB803634DF}"/>
-              </a:ext>
-            </a:extLst>
-          </p:cNvPr>
-          <p:cNvPicPr>
-            <a:picLocks noChangeAspect="1"/>
-          </p:cNvPicPr>
-          <p:nvPr/>
-        </p:nvPicPr>
-        <p:blipFill rotWithShape="1">
-          <a:blip r:embed="rId2">
-            <a:extLst>
-              <a:ext uri="{28A0092B-C50C-407E-A947-70E740481C1C}">
-                <a14:useLocalDpi xmlns:a14="http://schemas.microsoft.com/office/drawing/2010/main" val="0"/>
-              </a:ext>
-            </a:extLst>
-          </a:blip>
-          <a:srcRect l="9915" r="33924"/>
-          <a:stretch/>
-        </p:blipFill>
-        <p:spPr>
-          <a:xfrm>
-            <a:off x="2230003" y="56893"/>
-            <a:ext cx="9418366" cy="9348848"/>
-          </a:xfrm>
-          <a:prstGeom prst="rect">
-            <a:avLst/>
-          </a:prstGeom>
-        </p:spPr>
-      </p:pic>
-      <p:sp>
-        <p:nvSpPr>
-          <p:cNvPr id="19" name="TextBox 18">
-            <a:extLst>
-              <a:ext uri="{FF2B5EF4-FFF2-40B4-BE49-F238E27FC236}">
-                <a16:creationId xmlns:a16="http://schemas.microsoft.com/office/drawing/2014/main" id="{20025DB6-2843-4E26-84BA-39755FB06538}"/>
+      <p:sp>
+        <p:nvSpPr>
+          <p:cNvPr id="6" name="TextBox 5">
+            <a:extLst>
+              <a:ext uri="{FF2B5EF4-FFF2-40B4-BE49-F238E27FC236}">
+                <a16:creationId xmlns:a16="http://schemas.microsoft.com/office/drawing/2014/main" id="{375F391E-B890-4A84-8866-74A2442419A7}"/>
               </a:ext>
             </a:extLst>
           </p:cNvPr>
@@ -4501,46 +4971,62 @@
             </a:pPr>
             <a:r>
               <a:rPr lang="en-US" dirty="0"/>
-              <a:t>LED Enclosure Fluid Line Layout</a:t>
-            </a:r>
-          </a:p>
-        </p:txBody>
-      </p:sp>
-      <p:sp>
-        <p:nvSpPr>
-          <p:cNvPr id="4" name="Slide Number Placeholder 3">
-            <a:extLst>
-              <a:ext uri="{FF2B5EF4-FFF2-40B4-BE49-F238E27FC236}">
-                <a16:creationId xmlns:a16="http://schemas.microsoft.com/office/drawing/2014/main" id="{B12ED422-3E7D-4052-9B6C-0EB3AEEA2759}"/>
-              </a:ext>
-            </a:extLst>
-          </p:cNvPr>
-          <p:cNvSpPr>
-            <a:spLocks noGrp="1"/>
-          </p:cNvSpPr>
-          <p:nvPr>
-            <p:ph type="sldNum" sz="quarter" idx="12"/>
-          </p:nvPr>
-        </p:nvSpPr>
-        <p:spPr/>
-        <p:txBody>
-          <a:bodyPr/>
-          <a:lstStyle/>
-          <a:p>
-            <a:fld id="{C1069540-FC6E-4C70-8D36-8AEB2D59B40E}" type="slidenum">
-              <a:rPr lang="en-US" smtClean="0"/>
-              <a:t>4</a:t>
-            </a:fld>
-            <a:endParaRPr lang="en-US"/>
-          </a:p>
-        </p:txBody>
-      </p:sp>
+              <a:t>Suggested fluid line routing for LED Enclosures </a:t>
+            </a:r>
+          </a:p>
+        </p:txBody>
+      </p:sp>
+      <p:pic>
+        <p:nvPicPr>
+          <p:cNvPr id="7" name="Picture 6" descr="A close up of an object&#10;&#10;Description automatically generated">
+            <a:extLst>
+              <a:ext uri="{FF2B5EF4-FFF2-40B4-BE49-F238E27FC236}">
+                <a16:creationId xmlns:a16="http://schemas.microsoft.com/office/drawing/2014/main" id="{C8EBDEA0-53B8-45AB-9D62-605B26DC002D}"/>
+              </a:ext>
+            </a:extLst>
+          </p:cNvPr>
+          <p:cNvPicPr>
+            <a:picLocks noChangeAspect="1"/>
+          </p:cNvPicPr>
+          <p:nvPr/>
+        </p:nvPicPr>
+        <p:blipFill rotWithShape="1">
+          <a:blip r:embed="rId2">
+            <a:clrChange>
+              <a:clrFrom>
+                <a:srgbClr val="FFFFFF"/>
+              </a:clrFrom>
+              <a:clrTo>
+                <a:srgbClr val="FFFFFF">
+                  <a:alpha val="0"/>
+                </a:srgbClr>
+              </a:clrTo>
+            </a:clrChange>
+            <a:extLst>
+              <a:ext uri="{28A0092B-C50C-407E-A947-70E740481C1C}">
+                <a14:useLocalDpi xmlns:a14="http://schemas.microsoft.com/office/drawing/2010/main" val="0"/>
+              </a:ext>
+            </a:extLst>
+          </a:blip>
+          <a:srcRect t="8146" b="11932"/>
+          <a:stretch/>
+        </p:blipFill>
+        <p:spPr>
+          <a:xfrm rot="-120000">
+            <a:off x="1079094" y="126519"/>
+            <a:ext cx="7409885" cy="9130842"/>
+          </a:xfrm>
+          <a:prstGeom prst="rect">
+            <a:avLst/>
+          </a:prstGeom>
+        </p:spPr>
+      </p:pic>
       <p:cxnSp>
         <p:nvCxnSpPr>
-          <p:cNvPr id="9" name="Connector: Elbow 8">
-            <a:extLst>
-              <a:ext uri="{FF2B5EF4-FFF2-40B4-BE49-F238E27FC236}">
-                <a16:creationId xmlns:a16="http://schemas.microsoft.com/office/drawing/2014/main" id="{F8B6DD03-07A7-4ADB-A8E7-701CBE9CED37}"/>
+          <p:cNvPr id="9" name="Straight Connector 8">
+            <a:extLst>
+              <a:ext uri="{FF2B5EF4-FFF2-40B4-BE49-F238E27FC236}">
+                <a16:creationId xmlns:a16="http://schemas.microsoft.com/office/drawing/2014/main" id="{5FB40CFB-5AF5-4F4D-86BB-7210A7BB564C}"/>
               </a:ext>
             </a:extLst>
           </p:cNvPr>
@@ -4550,20 +5036,17 @@
           <p:nvPr/>
         </p:nvCxnSpPr>
         <p:spPr>
-          <a:xfrm rot="5400000" flipH="1" flipV="1">
-            <a:off x="-552450" y="2724150"/>
-            <a:ext cx="2552700" cy="355600"/>
-          </a:xfrm>
-          <a:prstGeom prst="bentConnector3">
-            <a:avLst>
-              <a:gd name="adj1" fmla="val 99254"/>
-            </a:avLst>
-          </a:prstGeom>
-          <a:ln w="38100">
+          <a:xfrm flipH="1">
+            <a:off x="4019550" y="8191316"/>
+            <a:ext cx="1050236" cy="590734"/>
+          </a:xfrm>
+          <a:prstGeom prst="line">
+            <a:avLst/>
+          </a:prstGeom>
+          <a:ln w="57150">
             <a:solidFill>
-              <a:srgbClr val="FF0000"/>
+              <a:srgbClr val="00B0F0"/>
             </a:solidFill>
-            <a:tailEnd type="none"/>
           </a:ln>
         </p:spPr>
         <p:style>
@@ -4583,10 +5066,10 @@
       </p:cxnSp>
       <p:cxnSp>
         <p:nvCxnSpPr>
-          <p:cNvPr id="17" name="Connector: Elbow 16">
-            <a:extLst>
-              <a:ext uri="{FF2B5EF4-FFF2-40B4-BE49-F238E27FC236}">
-                <a16:creationId xmlns:a16="http://schemas.microsoft.com/office/drawing/2014/main" id="{080FB133-092F-4A69-85EF-F48ED85517CB}"/>
+          <p:cNvPr id="11" name="Straight Connector 10">
+            <a:extLst>
+              <a:ext uri="{FF2B5EF4-FFF2-40B4-BE49-F238E27FC236}">
+                <a16:creationId xmlns:a16="http://schemas.microsoft.com/office/drawing/2014/main" id="{C9B0ABDA-C4E3-4B2F-A111-5310D79351C6}"/>
               </a:ext>
             </a:extLst>
           </p:cNvPr>
@@ -4596,20 +5079,17 @@
           <p:nvPr/>
         </p:nvCxnSpPr>
         <p:spPr>
-          <a:xfrm rot="5400000" flipH="1" flipV="1">
-            <a:off x="100744" y="3555148"/>
-            <a:ext cx="1068513" cy="177800"/>
-          </a:xfrm>
-          <a:prstGeom prst="bentConnector3">
-            <a:avLst>
-              <a:gd name="adj1" fmla="val -712"/>
-            </a:avLst>
-          </a:prstGeom>
-          <a:ln w="38100">
+          <a:xfrm>
+            <a:off x="1501833" y="5864723"/>
+            <a:ext cx="2544613" cy="2890431"/>
+          </a:xfrm>
+          <a:prstGeom prst="line">
+            <a:avLst/>
+          </a:prstGeom>
+          <a:ln w="57150">
             <a:solidFill>
               <a:srgbClr val="00B0F0"/>
             </a:solidFill>
-            <a:tailEnd type="none"/>
           </a:ln>
         </p:spPr>
         <p:style>
@@ -4629,10 +5109,10 @@
       </p:cxnSp>
       <p:cxnSp>
         <p:nvCxnSpPr>
-          <p:cNvPr id="24" name="Connector: Elbow 23">
-            <a:extLst>
-              <a:ext uri="{FF2B5EF4-FFF2-40B4-BE49-F238E27FC236}">
-                <a16:creationId xmlns:a16="http://schemas.microsoft.com/office/drawing/2014/main" id="{AA28E0C5-14BD-43B2-961B-BC3C72B1A729}"/>
+          <p:cNvPr id="15" name="Straight Connector 14">
+            <a:extLst>
+              <a:ext uri="{FF2B5EF4-FFF2-40B4-BE49-F238E27FC236}">
+                <a16:creationId xmlns:a16="http://schemas.microsoft.com/office/drawing/2014/main" id="{91F5B4EA-4701-4A98-A344-B1F0FFF43BD6}"/>
               </a:ext>
             </a:extLst>
           </p:cNvPr>
@@ -4642,20 +5122,17 @@
           <p:nvPr/>
         </p:nvCxnSpPr>
         <p:spPr>
-          <a:xfrm rot="16200000" flipH="1">
-            <a:off x="-605792" y="5502908"/>
-            <a:ext cx="2659387" cy="355601"/>
-          </a:xfrm>
-          <a:prstGeom prst="bentConnector3">
-            <a:avLst>
-              <a:gd name="adj1" fmla="val 101098"/>
-            </a:avLst>
-          </a:prstGeom>
-          <a:ln w="38100">
+          <a:xfrm flipH="1">
+            <a:off x="6972300" y="6667193"/>
+            <a:ext cx="847226" cy="479917"/>
+          </a:xfrm>
+          <a:prstGeom prst="line">
+            <a:avLst/>
+          </a:prstGeom>
+          <a:ln w="57150">
             <a:solidFill>
-              <a:srgbClr val="FF0000"/>
+              <a:srgbClr val="00B0F0"/>
             </a:solidFill>
-            <a:tailEnd type="none"/>
           </a:ln>
         </p:spPr>
         <p:style>
@@ -4675,10 +5152,10 @@
       </p:cxnSp>
       <p:cxnSp>
         <p:nvCxnSpPr>
-          <p:cNvPr id="25" name="Connector: Elbow 24">
-            <a:extLst>
-              <a:ext uri="{FF2B5EF4-FFF2-40B4-BE49-F238E27FC236}">
-                <a16:creationId xmlns:a16="http://schemas.microsoft.com/office/drawing/2014/main" id="{6C511411-A0F2-4A20-9B92-CB5BA2525864}"/>
+          <p:cNvPr id="34" name="Straight Connector 33">
+            <a:extLst>
+              <a:ext uri="{FF2B5EF4-FFF2-40B4-BE49-F238E27FC236}">
+                <a16:creationId xmlns:a16="http://schemas.microsoft.com/office/drawing/2014/main" id="{4676B1FD-56AF-4E89-9515-17EE5D2EFCF0}"/>
               </a:ext>
             </a:extLst>
           </p:cNvPr>
@@ -4688,20 +5165,17 @@
           <p:nvPr/>
         </p:nvCxnSpPr>
         <p:spPr>
-          <a:xfrm rot="16200000" flipV="1">
-            <a:off x="18645" y="4878470"/>
-            <a:ext cx="1232712" cy="177798"/>
-          </a:xfrm>
-          <a:prstGeom prst="bentConnector3">
-            <a:avLst>
-              <a:gd name="adj1" fmla="val 97113"/>
-            </a:avLst>
-          </a:prstGeom>
-          <a:ln w="38100">
+          <a:xfrm flipH="1">
+            <a:off x="7212650" y="3150159"/>
+            <a:ext cx="966708" cy="482177"/>
+          </a:xfrm>
+          <a:prstGeom prst="line">
+            <a:avLst/>
+          </a:prstGeom>
+          <a:ln w="57150">
             <a:solidFill>
-              <a:srgbClr val="00B0F0"/>
+              <a:srgbClr val="FF0000"/>
             </a:solidFill>
-            <a:tailEnd type="none"/>
           </a:ln>
         </p:spPr>
         <p:style>
@@ -4721,10 +5195,10 @@
       </p:cxnSp>
       <p:cxnSp>
         <p:nvCxnSpPr>
-          <p:cNvPr id="35" name="Straight Connector 34">
-            <a:extLst>
-              <a:ext uri="{FF2B5EF4-FFF2-40B4-BE49-F238E27FC236}">
-                <a16:creationId xmlns:a16="http://schemas.microsoft.com/office/drawing/2014/main" id="{4886A740-C8B1-44EA-8501-C7BBD05F627B}"/>
+          <p:cNvPr id="39" name="Straight Connector 38">
+            <a:extLst>
+              <a:ext uri="{FF2B5EF4-FFF2-40B4-BE49-F238E27FC236}">
+                <a16:creationId xmlns:a16="http://schemas.microsoft.com/office/drawing/2014/main" id="{04949928-FF6E-4C84-AC3E-0DCD9649B637}"/>
               </a:ext>
             </a:extLst>
           </p:cNvPr>
@@ -4734,18 +5208,17 @@
           <p:nvPr/>
         </p:nvCxnSpPr>
         <p:spPr>
-          <a:xfrm>
-            <a:off x="723900" y="3109792"/>
-            <a:ext cx="696790" cy="0"/>
+          <a:xfrm flipH="1">
+            <a:off x="1281869" y="363261"/>
+            <a:ext cx="3890923" cy="1858646"/>
           </a:xfrm>
           <a:prstGeom prst="line">
             <a:avLst/>
           </a:prstGeom>
-          <a:ln w="38100">
+          <a:ln w="57150">
             <a:solidFill>
-              <a:srgbClr val="00B0F0"/>
+              <a:srgbClr val="FF0000"/>
             </a:solidFill>
-            <a:tailEnd type="none"/>
           </a:ln>
         </p:spPr>
         <p:style>
@@ -4765,10 +5238,10 @@
       </p:cxnSp>
       <p:cxnSp>
         <p:nvCxnSpPr>
-          <p:cNvPr id="38" name="Straight Connector 37">
-            <a:extLst>
-              <a:ext uri="{FF2B5EF4-FFF2-40B4-BE49-F238E27FC236}">
-                <a16:creationId xmlns:a16="http://schemas.microsoft.com/office/drawing/2014/main" id="{7FF0C176-D50F-4DEA-A28F-57F3475B0088}"/>
+          <p:cNvPr id="43" name="Straight Connector 42">
+            <a:extLst>
+              <a:ext uri="{FF2B5EF4-FFF2-40B4-BE49-F238E27FC236}">
+                <a16:creationId xmlns:a16="http://schemas.microsoft.com/office/drawing/2014/main" id="{77405A90-30F8-455D-BD14-CAC51539BCDF}"/>
               </a:ext>
             </a:extLst>
           </p:cNvPr>
@@ -4778,18 +5251,17 @@
           <p:nvPr/>
         </p:nvCxnSpPr>
         <p:spPr>
-          <a:xfrm>
-            <a:off x="723900" y="5583726"/>
-            <a:ext cx="673100" cy="0"/>
+          <a:xfrm flipH="1" flipV="1">
+            <a:off x="1239140" y="2226116"/>
+            <a:ext cx="2873285" cy="3054700"/>
           </a:xfrm>
           <a:prstGeom prst="line">
             <a:avLst/>
           </a:prstGeom>
-          <a:ln w="38100">
+          <a:ln w="57150">
             <a:solidFill>
-              <a:srgbClr val="00B0F0"/>
+              <a:srgbClr val="FF0000"/>
             </a:solidFill>
-            <a:tailEnd type="none"/>
           </a:ln>
         </p:spPr>
         <p:style>
@@ -4809,10 +5281,10 @@
       </p:cxnSp>
       <p:cxnSp>
         <p:nvCxnSpPr>
-          <p:cNvPr id="40" name="Straight Connector 39">
-            <a:extLst>
-              <a:ext uri="{FF2B5EF4-FFF2-40B4-BE49-F238E27FC236}">
-                <a16:creationId xmlns:a16="http://schemas.microsoft.com/office/drawing/2014/main" id="{57E328D9-31CA-420D-9218-56297351841F}"/>
+          <p:cNvPr id="48" name="Straight Connector 47">
+            <a:extLst>
+              <a:ext uri="{FF2B5EF4-FFF2-40B4-BE49-F238E27FC236}">
+                <a16:creationId xmlns:a16="http://schemas.microsoft.com/office/drawing/2014/main" id="{EDB50555-FB46-4891-94CB-20E3CE0C3823}"/>
               </a:ext>
             </a:extLst>
           </p:cNvPr>
@@ -4822,18 +5294,17 @@
           <p:nvPr/>
         </p:nvCxnSpPr>
         <p:spPr>
-          <a:xfrm flipV="1">
-            <a:off x="5549911" y="532015"/>
-            <a:ext cx="0" cy="839592"/>
+          <a:xfrm flipH="1">
+            <a:off x="4068193" y="4691940"/>
+            <a:ext cx="1121691" cy="588876"/>
           </a:xfrm>
           <a:prstGeom prst="line">
             <a:avLst/>
           </a:prstGeom>
-          <a:ln w="38100">
+          <a:ln w="57150">
             <a:solidFill>
-              <a:srgbClr val="00B0F0"/>
+              <a:srgbClr val="FF0000"/>
             </a:solidFill>
-            <a:tailEnd type="none"/>
           </a:ln>
         </p:spPr>
         <p:style>
@@ -4853,10 +5324,10 @@
       </p:cxnSp>
       <p:cxnSp>
         <p:nvCxnSpPr>
-          <p:cNvPr id="56" name="Connector: Elbow 55">
-            <a:extLst>
-              <a:ext uri="{FF2B5EF4-FFF2-40B4-BE49-F238E27FC236}">
-                <a16:creationId xmlns:a16="http://schemas.microsoft.com/office/drawing/2014/main" id="{79E13C0F-32CC-4297-88C0-9C6EF59CB196}"/>
+          <p:cNvPr id="53" name="Connector: Curved 52">
+            <a:extLst>
+              <a:ext uri="{FF2B5EF4-FFF2-40B4-BE49-F238E27FC236}">
+                <a16:creationId xmlns:a16="http://schemas.microsoft.com/office/drawing/2014/main" id="{21744DD2-443E-406B-A991-BEBB10CC559C}"/>
               </a:ext>
             </a:extLst>
           </p:cNvPr>
@@ -4866,20 +5337,19 @@
           <p:nvPr/>
         </p:nvCxnSpPr>
         <p:spPr>
-          <a:xfrm flipV="1">
-            <a:off x="546100" y="533186"/>
-            <a:ext cx="5003811" cy="3645114"/>
-          </a:xfrm>
-          <a:prstGeom prst="bentConnector3">
+          <a:xfrm rot="5400000">
+            <a:off x="4735056" y="4794383"/>
+            <a:ext cx="584908" cy="352694"/>
+          </a:xfrm>
+          <a:prstGeom prst="curvedConnector3">
             <a:avLst>
-              <a:gd name="adj1" fmla="val -1559"/>
+              <a:gd name="adj1" fmla="val 154222"/>
             </a:avLst>
           </a:prstGeom>
           <a:ln w="38100">
             <a:solidFill>
-              <a:srgbClr val="00B0F0"/>
+              <a:srgbClr val="FF0000"/>
             </a:solidFill>
-            <a:tailEnd type="none"/>
           </a:ln>
         </p:spPr>
         <p:style>
@@ -4899,10 +5369,10 @@
       </p:cxnSp>
       <p:cxnSp>
         <p:nvCxnSpPr>
-          <p:cNvPr id="77" name="Connector: Elbow 76">
-            <a:extLst>
-              <a:ext uri="{FF2B5EF4-FFF2-40B4-BE49-F238E27FC236}">
-                <a16:creationId xmlns:a16="http://schemas.microsoft.com/office/drawing/2014/main" id="{7FAF7F91-000B-4FDA-BFB9-03DA63728476}"/>
+          <p:cNvPr id="61" name="Connector: Curved 60">
+            <a:extLst>
+              <a:ext uri="{FF2B5EF4-FFF2-40B4-BE49-F238E27FC236}">
+                <a16:creationId xmlns:a16="http://schemas.microsoft.com/office/drawing/2014/main" id="{7F8D8B15-8851-48C2-885B-7D0BE5794DF5}"/>
               </a:ext>
             </a:extLst>
           </p:cNvPr>
@@ -4912,20 +5382,19 @@
           <p:nvPr/>
         </p:nvCxnSpPr>
         <p:spPr>
-          <a:xfrm flipV="1">
-            <a:off x="464405" y="433629"/>
-            <a:ext cx="6522649" cy="3645076"/>
-          </a:xfrm>
-          <a:prstGeom prst="bentConnector3">
+          <a:xfrm rot="5400000">
+            <a:off x="4256023" y="5722157"/>
+            <a:ext cx="943754" cy="88401"/>
+          </a:xfrm>
+          <a:prstGeom prst="curvedConnector3">
             <a:avLst>
-              <a:gd name="adj1" fmla="val -911"/>
+              <a:gd name="adj1" fmla="val 122667"/>
             </a:avLst>
           </a:prstGeom>
           <a:ln w="38100">
             <a:solidFill>
               <a:srgbClr val="FF0000"/>
             </a:solidFill>
-            <a:tailEnd type="none"/>
           </a:ln>
         </p:spPr>
         <p:style>
@@ -4945,10 +5414,10 @@
       </p:cxnSp>
       <p:cxnSp>
         <p:nvCxnSpPr>
-          <p:cNvPr id="78" name="Straight Connector 77">
-            <a:extLst>
-              <a:ext uri="{FF2B5EF4-FFF2-40B4-BE49-F238E27FC236}">
-                <a16:creationId xmlns:a16="http://schemas.microsoft.com/office/drawing/2014/main" id="{71A1384A-F410-42E0-8387-2F579A1E424F}"/>
+          <p:cNvPr id="74" name="Connector: Curved 73">
+            <a:extLst>
+              <a:ext uri="{FF2B5EF4-FFF2-40B4-BE49-F238E27FC236}">
+                <a16:creationId xmlns:a16="http://schemas.microsoft.com/office/drawing/2014/main" id="{7228F8E5-41BF-44DB-B5D3-6726A644581E}"/>
               </a:ext>
             </a:extLst>
           </p:cNvPr>
@@ -4958,18 +5427,19 @@
           <p:nvPr/>
         </p:nvCxnSpPr>
         <p:spPr>
-          <a:xfrm flipV="1">
-            <a:off x="7011118" y="397533"/>
-            <a:ext cx="0" cy="974074"/>
-          </a:xfrm>
-          <a:prstGeom prst="line">
-            <a:avLst/>
+          <a:xfrm rot="5400000">
+            <a:off x="4225084" y="6639326"/>
+            <a:ext cx="1053185" cy="135954"/>
+          </a:xfrm>
+          <a:prstGeom prst="curvedConnector3">
+            <a:avLst>
+              <a:gd name="adj1" fmla="val 122352"/>
+            </a:avLst>
           </a:prstGeom>
           <a:ln w="38100">
             <a:solidFill>
-              <a:srgbClr val="FF0000"/>
+              <a:srgbClr val="00B0F0"/>
             </a:solidFill>
-            <a:tailEnd type="none"/>
           </a:ln>
         </p:spPr>
         <p:style>
@@ -4989,10 +5459,10 @@
       </p:cxnSp>
       <p:cxnSp>
         <p:nvCxnSpPr>
-          <p:cNvPr id="83" name="Straight Connector 82">
-            <a:extLst>
-              <a:ext uri="{FF2B5EF4-FFF2-40B4-BE49-F238E27FC236}">
-                <a16:creationId xmlns:a16="http://schemas.microsoft.com/office/drawing/2014/main" id="{3C2E3AE3-1851-401A-A0C1-504D337ABDA3}"/>
+          <p:cNvPr id="77" name="Connector: Curved 76">
+            <a:extLst>
+              <a:ext uri="{FF2B5EF4-FFF2-40B4-BE49-F238E27FC236}">
+                <a16:creationId xmlns:a16="http://schemas.microsoft.com/office/drawing/2014/main" id="{0CA2028C-B024-4CE5-B852-094F524670ED}"/>
               </a:ext>
             </a:extLst>
           </p:cNvPr>
@@ -5002,18 +5472,19 @@
           <p:nvPr/>
         </p:nvCxnSpPr>
         <p:spPr>
-          <a:xfrm flipV="1">
-            <a:off x="5561943" y="7313815"/>
-            <a:ext cx="0" cy="839592"/>
-          </a:xfrm>
-          <a:prstGeom prst="line">
-            <a:avLst/>
+          <a:xfrm rot="16200000" flipH="1">
+            <a:off x="4481766" y="7603297"/>
+            <a:ext cx="957418" cy="218620"/>
+          </a:xfrm>
+          <a:prstGeom prst="curvedConnector3">
+            <a:avLst>
+              <a:gd name="adj1" fmla="val 33087"/>
+            </a:avLst>
           </a:prstGeom>
           <a:ln w="38100">
             <a:solidFill>
               <a:srgbClr val="00B0F0"/>
             </a:solidFill>
-            <a:tailEnd type="none"/>
           </a:ln>
         </p:spPr>
         <p:style>
@@ -5033,10 +5504,10 @@
       </p:cxnSp>
       <p:cxnSp>
         <p:nvCxnSpPr>
-          <p:cNvPr id="84" name="Straight Connector 83">
-            <a:extLst>
-              <a:ext uri="{FF2B5EF4-FFF2-40B4-BE49-F238E27FC236}">
-                <a16:creationId xmlns:a16="http://schemas.microsoft.com/office/drawing/2014/main" id="{0E9A207F-97B1-454F-8E70-D6A5BA01E50B}"/>
+          <p:cNvPr id="82" name="Connector: Curved 81">
+            <a:extLst>
+              <a:ext uri="{FF2B5EF4-FFF2-40B4-BE49-F238E27FC236}">
+                <a16:creationId xmlns:a16="http://schemas.microsoft.com/office/drawing/2014/main" id="{156E36ED-AF05-402C-8095-3EF129E3ED4A}"/>
               </a:ext>
             </a:extLst>
           </p:cNvPr>
@@ -5046,18 +5517,19 @@
           <p:nvPr/>
         </p:nvCxnSpPr>
         <p:spPr>
-          <a:xfrm flipV="1">
-            <a:off x="7023150" y="7287621"/>
-            <a:ext cx="0" cy="974074"/>
-          </a:xfrm>
-          <a:prstGeom prst="line">
-            <a:avLst/>
+          <a:xfrm rot="5400000" flipH="1" flipV="1">
+            <a:off x="1864984" y="5817292"/>
+            <a:ext cx="877535" cy="454603"/>
+          </a:xfrm>
+          <a:prstGeom prst="curvedConnector3">
+            <a:avLst>
+              <a:gd name="adj1" fmla="val 76050"/>
+            </a:avLst>
           </a:prstGeom>
           <a:ln w="38100">
             <a:solidFill>
-              <a:srgbClr val="FF0000"/>
+              <a:srgbClr val="00B0F0"/>
             </a:solidFill>
-            <a:tailEnd type="none"/>
           </a:ln>
         </p:spPr>
         <p:style>
@@ -5077,10 +5549,10 @@
       </p:cxnSp>
       <p:cxnSp>
         <p:nvCxnSpPr>
-          <p:cNvPr id="85" name="Connector: Elbow 84">
-            <a:extLst>
-              <a:ext uri="{FF2B5EF4-FFF2-40B4-BE49-F238E27FC236}">
-                <a16:creationId xmlns:a16="http://schemas.microsoft.com/office/drawing/2014/main" id="{200A8978-AA00-4BE9-B854-4C33B4A61C05}"/>
+          <p:cNvPr id="86" name="Connector: Curved 85">
+            <a:extLst>
+              <a:ext uri="{FF2B5EF4-FFF2-40B4-BE49-F238E27FC236}">
+                <a16:creationId xmlns:a16="http://schemas.microsoft.com/office/drawing/2014/main" id="{EE234DC7-22A3-4973-ADF3-1341F97019AE}"/>
               </a:ext>
             </a:extLst>
           </p:cNvPr>
@@ -5090,20 +5562,19 @@
           <p:nvPr/>
         </p:nvCxnSpPr>
         <p:spPr>
-          <a:xfrm>
-            <a:off x="464405" y="4383411"/>
-            <a:ext cx="6570777" cy="3870646"/>
-          </a:xfrm>
-          <a:prstGeom prst="bentConnector3">
+          <a:xfrm rot="16200000" flipH="1">
+            <a:off x="2010292" y="5091565"/>
+            <a:ext cx="1084378" cy="119782"/>
+          </a:xfrm>
+          <a:prstGeom prst="curvedConnector3">
             <a:avLst>
-              <a:gd name="adj1" fmla="val -904"/>
+              <a:gd name="adj1" fmla="val 50000"/>
             </a:avLst>
           </a:prstGeom>
           <a:ln w="38100">
             <a:solidFill>
-              <a:srgbClr val="FF0000"/>
+              <a:srgbClr val="00B0F0"/>
             </a:solidFill>
-            <a:tailEnd type="none"/>
           </a:ln>
         </p:spPr>
         <p:style>
@@ -5123,10 +5594,10 @@
       </p:cxnSp>
       <p:cxnSp>
         <p:nvCxnSpPr>
-          <p:cNvPr id="89" name="Connector: Elbow 88">
-            <a:extLst>
-              <a:ext uri="{FF2B5EF4-FFF2-40B4-BE49-F238E27FC236}">
-                <a16:creationId xmlns:a16="http://schemas.microsoft.com/office/drawing/2014/main" id="{1BED05AA-21B3-444A-9DA6-FEB826FFA492}"/>
+          <p:cNvPr id="93" name="Connector: Curved 92">
+            <a:extLst>
+              <a:ext uri="{FF2B5EF4-FFF2-40B4-BE49-F238E27FC236}">
+                <a16:creationId xmlns:a16="http://schemas.microsoft.com/office/drawing/2014/main" id="{25706591-DB97-4711-A6E5-5D4F57259BD8}"/>
               </a:ext>
             </a:extLst>
           </p:cNvPr>
@@ -5136,20 +5607,19 @@
           <p:nvPr/>
         </p:nvCxnSpPr>
         <p:spPr>
-          <a:xfrm>
-            <a:off x="464405" y="4392481"/>
-            <a:ext cx="5097538" cy="3754739"/>
-          </a:xfrm>
-          <a:prstGeom prst="bentConnector3">
+          <a:xfrm rot="16200000" flipH="1">
+            <a:off x="1884607" y="3143175"/>
+            <a:ext cx="685013" cy="460673"/>
+          </a:xfrm>
+          <a:prstGeom prst="curvedConnector3">
             <a:avLst>
-              <a:gd name="adj1" fmla="val 434"/>
+              <a:gd name="adj1" fmla="val 147334"/>
             </a:avLst>
           </a:prstGeom>
           <a:ln w="38100">
             <a:solidFill>
-              <a:srgbClr val="00B0F0"/>
+              <a:srgbClr val="FF0000"/>
             </a:solidFill>
-            <a:tailEnd type="none"/>
           </a:ln>
         </p:spPr>
         <p:style>
@@ -5169,10 +5639,10 @@
       </p:cxnSp>
       <p:cxnSp>
         <p:nvCxnSpPr>
-          <p:cNvPr id="94" name="Straight Arrow Connector 93">
-            <a:extLst>
-              <a:ext uri="{FF2B5EF4-FFF2-40B4-BE49-F238E27FC236}">
-                <a16:creationId xmlns:a16="http://schemas.microsoft.com/office/drawing/2014/main" id="{82F667C6-412D-42B3-A140-6A5936B18BD3}"/>
+          <p:cNvPr id="96" name="Connector: Curved 95">
+            <a:extLst>
+              <a:ext uri="{FF2B5EF4-FFF2-40B4-BE49-F238E27FC236}">
+                <a16:creationId xmlns:a16="http://schemas.microsoft.com/office/drawing/2014/main" id="{4C7B2389-D86E-4622-9F33-E3AABC4AD5D1}"/>
               </a:ext>
             </a:extLst>
           </p:cNvPr>
@@ -5182,9 +5652,54 @@
           <p:nvPr/>
         </p:nvCxnSpPr>
         <p:spPr>
-          <a:xfrm>
-            <a:off x="861214" y="6875735"/>
-            <a:ext cx="400954" cy="0"/>
+          <a:xfrm rot="5400000">
+            <a:off x="2037490" y="4168530"/>
+            <a:ext cx="913525" cy="73602"/>
+          </a:xfrm>
+          <a:prstGeom prst="curvedConnector3">
+            <a:avLst>
+              <a:gd name="adj1" fmla="val 50000"/>
+            </a:avLst>
+          </a:prstGeom>
+          <a:ln w="38100">
+            <a:solidFill>
+              <a:srgbClr val="FF0000"/>
+            </a:solidFill>
+          </a:ln>
+        </p:spPr>
+        <p:style>
+          <a:lnRef idx="1">
+            <a:schemeClr val="accent1"/>
+          </a:lnRef>
+          <a:fillRef idx="0">
+            <a:schemeClr val="accent1"/>
+          </a:fillRef>
+          <a:effectRef idx="0">
+            <a:schemeClr val="accent1"/>
+          </a:effectRef>
+          <a:fontRef idx="minor">
+            <a:schemeClr val="tx1"/>
+          </a:fontRef>
+        </p:style>
+      </p:cxnSp>
+      <p:cxnSp>
+        <p:nvCxnSpPr>
+          <p:cNvPr id="104" name="Straight Arrow Connector 103">
+            <a:extLst>
+              <a:ext uri="{FF2B5EF4-FFF2-40B4-BE49-F238E27FC236}">
+                <a16:creationId xmlns:a16="http://schemas.microsoft.com/office/drawing/2014/main" id="{A3827F57-9411-4C3F-8320-0F31DA9F5E2F}"/>
+              </a:ext>
+            </a:extLst>
+          </p:cNvPr>
+          <p:cNvCxnSpPr>
+            <a:cxnSpLocks/>
+          </p:cNvCxnSpPr>
+          <p:nvPr/>
+        </p:nvCxnSpPr>
+        <p:spPr>
+          <a:xfrm flipH="1">
+            <a:off x="4273905" y="295591"/>
+            <a:ext cx="577258" cy="282184"/>
           </a:xfrm>
           <a:prstGeom prst="straightConnector1">
             <a:avLst/>
@@ -5213,10 +5728,10 @@
       </p:cxnSp>
       <p:cxnSp>
         <p:nvCxnSpPr>
-          <p:cNvPr id="96" name="Straight Arrow Connector 95">
-            <a:extLst>
-              <a:ext uri="{FF2B5EF4-FFF2-40B4-BE49-F238E27FC236}">
-                <a16:creationId xmlns:a16="http://schemas.microsoft.com/office/drawing/2014/main" id="{A58E46A0-5F07-421E-B70A-F5C9C29271E6}"/>
+          <p:cNvPr id="105" name="Straight Arrow Connector 104">
+            <a:extLst>
+              <a:ext uri="{FF2B5EF4-FFF2-40B4-BE49-F238E27FC236}">
+                <a16:creationId xmlns:a16="http://schemas.microsoft.com/office/drawing/2014/main" id="{377AB7D1-628C-40CD-A58B-21C2AB13B4CA}"/>
               </a:ext>
             </a:extLst>
           </p:cNvPr>
@@ -5226,9 +5741,9 @@
           <p:nvPr/>
         </p:nvCxnSpPr>
         <p:spPr>
-          <a:xfrm flipH="1">
-            <a:off x="861214" y="5434725"/>
-            <a:ext cx="331127" cy="0"/>
+          <a:xfrm>
+            <a:off x="1336600" y="6321103"/>
+            <a:ext cx="570489" cy="670800"/>
           </a:xfrm>
           <a:prstGeom prst="straightConnector1">
             <a:avLst/>
@@ -5255,10 +5770,1022 @@
           </a:fontRef>
         </p:style>
       </p:cxnSp>
+      <p:cxnSp>
+        <p:nvCxnSpPr>
+          <p:cNvPr id="108" name="Straight Arrow Connector 107">
+            <a:extLst>
+              <a:ext uri="{FF2B5EF4-FFF2-40B4-BE49-F238E27FC236}">
+                <a16:creationId xmlns:a16="http://schemas.microsoft.com/office/drawing/2014/main" id="{6401B747-5E27-4FAF-A1BD-8F1E6B7C7396}"/>
+              </a:ext>
+            </a:extLst>
+          </p:cNvPr>
+          <p:cNvCxnSpPr>
+            <a:cxnSpLocks/>
+          </p:cNvCxnSpPr>
+          <p:nvPr/>
+        </p:nvCxnSpPr>
+        <p:spPr>
+          <a:xfrm flipV="1">
+            <a:off x="1540639" y="1586244"/>
+            <a:ext cx="564741" cy="252885"/>
+          </a:xfrm>
+          <a:prstGeom prst="straightConnector1">
+            <a:avLst/>
+          </a:prstGeom>
+          <a:ln w="57150">
+            <a:solidFill>
+              <a:srgbClr val="FF0000"/>
+            </a:solidFill>
+            <a:tailEnd type="triangle" w="med" len="med"/>
+          </a:ln>
+        </p:spPr>
+        <p:style>
+          <a:lnRef idx="1">
+            <a:schemeClr val="accent1"/>
+          </a:lnRef>
+          <a:fillRef idx="0">
+            <a:schemeClr val="accent1"/>
+          </a:fillRef>
+          <a:effectRef idx="0">
+            <a:schemeClr val="accent1"/>
+          </a:effectRef>
+          <a:fontRef idx="minor">
+            <a:schemeClr val="tx1"/>
+          </a:fontRef>
+        </p:style>
+      </p:cxnSp>
+      <p:cxnSp>
+        <p:nvCxnSpPr>
+          <p:cNvPr id="109" name="Straight Arrow Connector 108">
+            <a:extLst>
+              <a:ext uri="{FF2B5EF4-FFF2-40B4-BE49-F238E27FC236}">
+                <a16:creationId xmlns:a16="http://schemas.microsoft.com/office/drawing/2014/main" id="{4A1B0417-D400-462B-B3E8-56C4437DBA1F}"/>
+              </a:ext>
+            </a:extLst>
+          </p:cNvPr>
+          <p:cNvCxnSpPr>
+            <a:cxnSpLocks/>
+          </p:cNvCxnSpPr>
+          <p:nvPr/>
+        </p:nvCxnSpPr>
+        <p:spPr>
+          <a:xfrm flipH="1" flipV="1">
+            <a:off x="2245810" y="6137758"/>
+            <a:ext cx="10783" cy="428917"/>
+          </a:xfrm>
+          <a:prstGeom prst="straightConnector1">
+            <a:avLst/>
+          </a:prstGeom>
+          <a:ln w="57150">
+            <a:solidFill>
+              <a:srgbClr val="00B0F0"/>
+            </a:solidFill>
+            <a:tailEnd type="triangle" w="med" len="med"/>
+          </a:ln>
+        </p:spPr>
+        <p:style>
+          <a:lnRef idx="1">
+            <a:schemeClr val="accent1"/>
+          </a:lnRef>
+          <a:fillRef idx="0">
+            <a:schemeClr val="accent1"/>
+          </a:fillRef>
+          <a:effectRef idx="0">
+            <a:schemeClr val="accent1"/>
+          </a:effectRef>
+          <a:fontRef idx="minor">
+            <a:schemeClr val="tx1"/>
+          </a:fontRef>
+        </p:style>
+      </p:cxnSp>
+      <p:cxnSp>
+        <p:nvCxnSpPr>
+          <p:cNvPr id="112" name="Straight Arrow Connector 111">
+            <a:extLst>
+              <a:ext uri="{FF2B5EF4-FFF2-40B4-BE49-F238E27FC236}">
+                <a16:creationId xmlns:a16="http://schemas.microsoft.com/office/drawing/2014/main" id="{99CA16C2-A42D-4C95-B172-C12F5D450806}"/>
+              </a:ext>
+            </a:extLst>
+          </p:cNvPr>
+          <p:cNvCxnSpPr>
+            <a:cxnSpLocks/>
+          </p:cNvCxnSpPr>
+          <p:nvPr/>
+        </p:nvCxnSpPr>
+        <p:spPr>
+          <a:xfrm>
+            <a:off x="2473871" y="7648316"/>
+            <a:ext cx="570489" cy="670800"/>
+          </a:xfrm>
+          <a:prstGeom prst="straightConnector1">
+            <a:avLst/>
+          </a:prstGeom>
+          <a:ln w="57150">
+            <a:solidFill>
+              <a:srgbClr val="00B0F0"/>
+            </a:solidFill>
+            <a:tailEnd type="triangle" w="med" len="med"/>
+          </a:ln>
+        </p:spPr>
+        <p:style>
+          <a:lnRef idx="1">
+            <a:schemeClr val="accent1"/>
+          </a:lnRef>
+          <a:fillRef idx="0">
+            <a:schemeClr val="accent1"/>
+          </a:fillRef>
+          <a:effectRef idx="0">
+            <a:schemeClr val="accent1"/>
+          </a:effectRef>
+          <a:fontRef idx="minor">
+            <a:schemeClr val="tx1"/>
+          </a:fontRef>
+        </p:style>
+      </p:cxnSp>
+      <p:cxnSp>
+        <p:nvCxnSpPr>
+          <p:cNvPr id="113" name="Straight Arrow Connector 112">
+            <a:extLst>
+              <a:ext uri="{FF2B5EF4-FFF2-40B4-BE49-F238E27FC236}">
+                <a16:creationId xmlns:a16="http://schemas.microsoft.com/office/drawing/2014/main" id="{E6473C97-22A4-435E-B434-92100A6468E7}"/>
+              </a:ext>
+            </a:extLst>
+          </p:cNvPr>
+          <p:cNvCxnSpPr>
+            <a:cxnSpLocks/>
+          </p:cNvCxnSpPr>
+          <p:nvPr/>
+        </p:nvCxnSpPr>
+        <p:spPr>
+          <a:xfrm flipV="1">
+            <a:off x="4573961" y="8766457"/>
+            <a:ext cx="657882" cy="386948"/>
+          </a:xfrm>
+          <a:prstGeom prst="straightConnector1">
+            <a:avLst/>
+          </a:prstGeom>
+          <a:ln w="57150">
+            <a:solidFill>
+              <a:srgbClr val="00B0F0"/>
+            </a:solidFill>
+            <a:tailEnd type="triangle" w="med" len="med"/>
+          </a:ln>
+        </p:spPr>
+        <p:style>
+          <a:lnRef idx="1">
+            <a:schemeClr val="accent1"/>
+          </a:lnRef>
+          <a:fillRef idx="0">
+            <a:schemeClr val="accent1"/>
+          </a:fillRef>
+          <a:effectRef idx="0">
+            <a:schemeClr val="accent1"/>
+          </a:effectRef>
+          <a:fontRef idx="minor">
+            <a:schemeClr val="tx1"/>
+          </a:fontRef>
+        </p:style>
+      </p:cxnSp>
+      <p:cxnSp>
+        <p:nvCxnSpPr>
+          <p:cNvPr id="116" name="Straight Arrow Connector 115">
+            <a:extLst>
+              <a:ext uri="{FF2B5EF4-FFF2-40B4-BE49-F238E27FC236}">
+                <a16:creationId xmlns:a16="http://schemas.microsoft.com/office/drawing/2014/main" id="{AE63F4AC-4A18-44CD-A8A7-046CC5EEFA7D}"/>
+              </a:ext>
+            </a:extLst>
+          </p:cNvPr>
+          <p:cNvCxnSpPr>
+            <a:cxnSpLocks/>
+          </p:cNvCxnSpPr>
+          <p:nvPr/>
+        </p:nvCxnSpPr>
+        <p:spPr>
+          <a:xfrm flipH="1">
+            <a:off x="7250982" y="7233896"/>
+            <a:ext cx="596894" cy="345388"/>
+          </a:xfrm>
+          <a:prstGeom prst="straightConnector1">
+            <a:avLst/>
+          </a:prstGeom>
+          <a:ln w="57150">
+            <a:solidFill>
+              <a:srgbClr val="00B0F0"/>
+            </a:solidFill>
+            <a:tailEnd type="triangle" w="med" len="med"/>
+          </a:ln>
+        </p:spPr>
+        <p:style>
+          <a:lnRef idx="1">
+            <a:schemeClr val="accent1"/>
+          </a:lnRef>
+          <a:fillRef idx="0">
+            <a:schemeClr val="accent1"/>
+          </a:fillRef>
+          <a:effectRef idx="0">
+            <a:schemeClr val="accent1"/>
+          </a:effectRef>
+          <a:fontRef idx="minor">
+            <a:schemeClr val="tx1"/>
+          </a:fontRef>
+        </p:style>
+      </p:cxnSp>
+      <p:cxnSp>
+        <p:nvCxnSpPr>
+          <p:cNvPr id="132" name="Straight Arrow Connector 131">
+            <a:extLst>
+              <a:ext uri="{FF2B5EF4-FFF2-40B4-BE49-F238E27FC236}">
+                <a16:creationId xmlns:a16="http://schemas.microsoft.com/office/drawing/2014/main" id="{EC490813-A32C-4096-AD99-1AEE8A3DFC16}"/>
+              </a:ext>
+            </a:extLst>
+          </p:cNvPr>
+          <p:cNvCxnSpPr>
+            <a:cxnSpLocks/>
+          </p:cNvCxnSpPr>
+          <p:nvPr/>
+        </p:nvCxnSpPr>
+        <p:spPr>
+          <a:xfrm flipH="1" flipV="1">
+            <a:off x="4854705" y="7709098"/>
+            <a:ext cx="10783" cy="428917"/>
+          </a:xfrm>
+          <a:prstGeom prst="straightConnector1">
+            <a:avLst/>
+          </a:prstGeom>
+          <a:ln w="57150">
+            <a:solidFill>
+              <a:srgbClr val="00B0F0"/>
+            </a:solidFill>
+            <a:tailEnd type="triangle" w="med" len="med"/>
+          </a:ln>
+        </p:spPr>
+        <p:style>
+          <a:lnRef idx="1">
+            <a:schemeClr val="accent1"/>
+          </a:lnRef>
+          <a:fillRef idx="0">
+            <a:schemeClr val="accent1"/>
+          </a:fillRef>
+          <a:effectRef idx="0">
+            <a:schemeClr val="accent1"/>
+          </a:effectRef>
+          <a:fontRef idx="minor">
+            <a:schemeClr val="tx1"/>
+          </a:fontRef>
+        </p:style>
+      </p:cxnSp>
+      <p:cxnSp>
+        <p:nvCxnSpPr>
+          <p:cNvPr id="133" name="Straight Arrow Connector 132">
+            <a:extLst>
+              <a:ext uri="{FF2B5EF4-FFF2-40B4-BE49-F238E27FC236}">
+                <a16:creationId xmlns:a16="http://schemas.microsoft.com/office/drawing/2014/main" id="{3B3D69C2-E8D8-4442-BDF8-1047699420E2}"/>
+              </a:ext>
+            </a:extLst>
+          </p:cNvPr>
+          <p:cNvCxnSpPr>
+            <a:cxnSpLocks/>
+          </p:cNvCxnSpPr>
+          <p:nvPr/>
+        </p:nvCxnSpPr>
+        <p:spPr>
+          <a:xfrm flipH="1" flipV="1">
+            <a:off x="6842123" y="6638213"/>
+            <a:ext cx="10783" cy="428917"/>
+          </a:xfrm>
+          <a:prstGeom prst="straightConnector1">
+            <a:avLst/>
+          </a:prstGeom>
+          <a:ln w="57150">
+            <a:solidFill>
+              <a:srgbClr val="00B0F0"/>
+            </a:solidFill>
+            <a:tailEnd type="triangle" w="med" len="med"/>
+          </a:ln>
+        </p:spPr>
+        <p:style>
+          <a:lnRef idx="1">
+            <a:schemeClr val="accent1"/>
+          </a:lnRef>
+          <a:fillRef idx="0">
+            <a:schemeClr val="accent1"/>
+          </a:fillRef>
+          <a:effectRef idx="0">
+            <a:schemeClr val="accent1"/>
+          </a:effectRef>
+          <a:fontRef idx="minor">
+            <a:schemeClr val="tx1"/>
+          </a:fontRef>
+        </p:style>
+      </p:cxnSp>
+      <p:cxnSp>
+        <p:nvCxnSpPr>
+          <p:cNvPr id="134" name="Connector: Curved 133">
+            <a:extLst>
+              <a:ext uri="{FF2B5EF4-FFF2-40B4-BE49-F238E27FC236}">
+                <a16:creationId xmlns:a16="http://schemas.microsoft.com/office/drawing/2014/main" id="{CC1E3B10-6BD7-4103-9D64-34F7C2D3B456}"/>
+              </a:ext>
+            </a:extLst>
+          </p:cNvPr>
+          <p:cNvCxnSpPr>
+            <a:cxnSpLocks/>
+          </p:cNvCxnSpPr>
+          <p:nvPr/>
+        </p:nvCxnSpPr>
+        <p:spPr>
+          <a:xfrm rot="5400000">
+            <a:off x="6733602" y="3738918"/>
+            <a:ext cx="584908" cy="352694"/>
+          </a:xfrm>
+          <a:prstGeom prst="curvedConnector3">
+            <a:avLst>
+              <a:gd name="adj1" fmla="val 154222"/>
+            </a:avLst>
+          </a:prstGeom>
+          <a:ln w="38100">
+            <a:solidFill>
+              <a:srgbClr val="FF0000"/>
+            </a:solidFill>
+          </a:ln>
+        </p:spPr>
+        <p:style>
+          <a:lnRef idx="1">
+            <a:schemeClr val="accent1"/>
+          </a:lnRef>
+          <a:fillRef idx="0">
+            <a:schemeClr val="accent1"/>
+          </a:fillRef>
+          <a:effectRef idx="0">
+            <a:schemeClr val="accent1"/>
+          </a:effectRef>
+          <a:fontRef idx="minor">
+            <a:schemeClr val="tx1"/>
+          </a:fontRef>
+        </p:style>
+      </p:cxnSp>
+      <p:cxnSp>
+        <p:nvCxnSpPr>
+          <p:cNvPr id="135" name="Connector: Curved 134">
+            <a:extLst>
+              <a:ext uri="{FF2B5EF4-FFF2-40B4-BE49-F238E27FC236}">
+                <a16:creationId xmlns:a16="http://schemas.microsoft.com/office/drawing/2014/main" id="{92299EF3-413C-41A7-9250-E030EF744ABE}"/>
+              </a:ext>
+            </a:extLst>
+          </p:cNvPr>
+          <p:cNvCxnSpPr>
+            <a:cxnSpLocks/>
+          </p:cNvCxnSpPr>
+          <p:nvPr/>
+        </p:nvCxnSpPr>
+        <p:spPr>
+          <a:xfrm rot="5400000">
+            <a:off x="6193776" y="4701490"/>
+            <a:ext cx="1089150" cy="96830"/>
+          </a:xfrm>
+          <a:prstGeom prst="curvedConnector3">
+            <a:avLst>
+              <a:gd name="adj1" fmla="val 110343"/>
+            </a:avLst>
+          </a:prstGeom>
+          <a:ln w="38100">
+            <a:solidFill>
+              <a:srgbClr val="FF0000"/>
+            </a:solidFill>
+          </a:ln>
+        </p:spPr>
+        <p:style>
+          <a:lnRef idx="1">
+            <a:schemeClr val="accent1"/>
+          </a:lnRef>
+          <a:fillRef idx="0">
+            <a:schemeClr val="accent1"/>
+          </a:fillRef>
+          <a:effectRef idx="0">
+            <a:schemeClr val="accent1"/>
+          </a:effectRef>
+          <a:fontRef idx="minor">
+            <a:schemeClr val="tx1"/>
+          </a:fontRef>
+        </p:style>
+      </p:cxnSp>
+      <p:cxnSp>
+        <p:nvCxnSpPr>
+          <p:cNvPr id="144" name="Connector: Curved 143">
+            <a:extLst>
+              <a:ext uri="{FF2B5EF4-FFF2-40B4-BE49-F238E27FC236}">
+                <a16:creationId xmlns:a16="http://schemas.microsoft.com/office/drawing/2014/main" id="{9B9D9D20-17D8-499E-8AA2-576652F9815D}"/>
+              </a:ext>
+            </a:extLst>
+          </p:cNvPr>
+          <p:cNvCxnSpPr>
+            <a:cxnSpLocks/>
+          </p:cNvCxnSpPr>
+          <p:nvPr/>
+        </p:nvCxnSpPr>
+        <p:spPr>
+          <a:xfrm rot="5400000">
+            <a:off x="6237774" y="5656787"/>
+            <a:ext cx="1016161" cy="163777"/>
+          </a:xfrm>
+          <a:prstGeom prst="curvedConnector3">
+            <a:avLst>
+              <a:gd name="adj1" fmla="val 115615"/>
+            </a:avLst>
+          </a:prstGeom>
+          <a:ln w="38100">
+            <a:solidFill>
+              <a:srgbClr val="00B0F0"/>
+            </a:solidFill>
+          </a:ln>
+        </p:spPr>
+        <p:style>
+          <a:lnRef idx="1">
+            <a:schemeClr val="accent1"/>
+          </a:lnRef>
+          <a:fillRef idx="0">
+            <a:schemeClr val="accent1"/>
+          </a:fillRef>
+          <a:effectRef idx="0">
+            <a:schemeClr val="accent1"/>
+          </a:effectRef>
+          <a:fontRef idx="minor">
+            <a:schemeClr val="tx1"/>
+          </a:fontRef>
+        </p:style>
+      </p:cxnSp>
+      <p:cxnSp>
+        <p:nvCxnSpPr>
+          <p:cNvPr id="147" name="Connector: Curved 146">
+            <a:extLst>
+              <a:ext uri="{FF2B5EF4-FFF2-40B4-BE49-F238E27FC236}">
+                <a16:creationId xmlns:a16="http://schemas.microsoft.com/office/drawing/2014/main" id="{86AD3F28-8965-47B9-9308-4661C0B82981}"/>
+              </a:ext>
+            </a:extLst>
+          </p:cNvPr>
+          <p:cNvCxnSpPr>
+            <a:cxnSpLocks/>
+          </p:cNvCxnSpPr>
+          <p:nvPr/>
+        </p:nvCxnSpPr>
+        <p:spPr>
+          <a:xfrm rot="16200000" flipH="1">
+            <a:off x="6384932" y="6501055"/>
+            <a:ext cx="949202" cy="268856"/>
+          </a:xfrm>
+          <a:prstGeom prst="curvedConnector3">
+            <a:avLst>
+              <a:gd name="adj1" fmla="val 9861"/>
+            </a:avLst>
+          </a:prstGeom>
+          <a:ln w="38100">
+            <a:solidFill>
+              <a:srgbClr val="00B0F0"/>
+            </a:solidFill>
+          </a:ln>
+        </p:spPr>
+        <p:style>
+          <a:lnRef idx="1">
+            <a:schemeClr val="accent1"/>
+          </a:lnRef>
+          <a:fillRef idx="0">
+            <a:schemeClr val="accent1"/>
+          </a:fillRef>
+          <a:effectRef idx="0">
+            <a:schemeClr val="accent1"/>
+          </a:effectRef>
+          <a:fontRef idx="minor">
+            <a:schemeClr val="tx1"/>
+          </a:fontRef>
+        </p:style>
+      </p:cxnSp>
+      <p:cxnSp>
+        <p:nvCxnSpPr>
+          <p:cNvPr id="150" name="Straight Arrow Connector 149">
+            <a:extLst>
+              <a:ext uri="{FF2B5EF4-FFF2-40B4-BE49-F238E27FC236}">
+                <a16:creationId xmlns:a16="http://schemas.microsoft.com/office/drawing/2014/main" id="{CDB13EA2-1C65-42B2-9736-CE74A47585DA}"/>
+              </a:ext>
+            </a:extLst>
+          </p:cNvPr>
+          <p:cNvCxnSpPr>
+            <a:cxnSpLocks/>
+          </p:cNvCxnSpPr>
+          <p:nvPr/>
+        </p:nvCxnSpPr>
+        <p:spPr>
+          <a:xfrm flipH="1">
+            <a:off x="4662992" y="4502417"/>
+            <a:ext cx="454757" cy="247488"/>
+          </a:xfrm>
+          <a:prstGeom prst="straightConnector1">
+            <a:avLst/>
+          </a:prstGeom>
+          <a:ln w="57150">
+            <a:solidFill>
+              <a:srgbClr val="FF0000"/>
+            </a:solidFill>
+            <a:tailEnd type="triangle" w="med" len="med"/>
+          </a:ln>
+        </p:spPr>
+        <p:style>
+          <a:lnRef idx="1">
+            <a:schemeClr val="accent1"/>
+          </a:lnRef>
+          <a:fillRef idx="0">
+            <a:schemeClr val="accent1"/>
+          </a:fillRef>
+          <a:effectRef idx="0">
+            <a:schemeClr val="accent1"/>
+          </a:effectRef>
+          <a:fontRef idx="minor">
+            <a:schemeClr val="tx1"/>
+          </a:fontRef>
+        </p:style>
+      </p:cxnSp>
+      <p:cxnSp>
+        <p:nvCxnSpPr>
+          <p:cNvPr id="153" name="Straight Arrow Connector 152">
+            <a:extLst>
+              <a:ext uri="{FF2B5EF4-FFF2-40B4-BE49-F238E27FC236}">
+                <a16:creationId xmlns:a16="http://schemas.microsoft.com/office/drawing/2014/main" id="{40D60DD2-D179-439E-B4A1-0C5AB5FC64D8}"/>
+              </a:ext>
+            </a:extLst>
+          </p:cNvPr>
+          <p:cNvCxnSpPr>
+            <a:cxnSpLocks/>
+          </p:cNvCxnSpPr>
+          <p:nvPr/>
+        </p:nvCxnSpPr>
+        <p:spPr>
+          <a:xfrm flipH="1" flipV="1">
+            <a:off x="2150376" y="2918023"/>
+            <a:ext cx="306750" cy="304662"/>
+          </a:xfrm>
+          <a:prstGeom prst="straightConnector1">
+            <a:avLst/>
+          </a:prstGeom>
+          <a:ln w="57150">
+            <a:solidFill>
+              <a:srgbClr val="FF0000"/>
+            </a:solidFill>
+            <a:tailEnd type="triangle" w="med" len="med"/>
+          </a:ln>
+        </p:spPr>
+        <p:style>
+          <a:lnRef idx="1">
+            <a:schemeClr val="accent1"/>
+          </a:lnRef>
+          <a:fillRef idx="0">
+            <a:schemeClr val="accent1"/>
+          </a:fillRef>
+          <a:effectRef idx="0">
+            <a:schemeClr val="accent1"/>
+          </a:effectRef>
+          <a:fontRef idx="minor">
+            <a:schemeClr val="tx1"/>
+          </a:fontRef>
+        </p:style>
+      </p:cxnSp>
+      <p:cxnSp>
+        <p:nvCxnSpPr>
+          <p:cNvPr id="163" name="Straight Arrow Connector 162">
+            <a:extLst>
+              <a:ext uri="{FF2B5EF4-FFF2-40B4-BE49-F238E27FC236}">
+                <a16:creationId xmlns:a16="http://schemas.microsoft.com/office/drawing/2014/main" id="{5CBD7120-F98A-4C60-8D95-B1FDB66004D4}"/>
+              </a:ext>
+            </a:extLst>
+          </p:cNvPr>
+          <p:cNvCxnSpPr>
+            <a:cxnSpLocks/>
+          </p:cNvCxnSpPr>
+          <p:nvPr/>
+        </p:nvCxnSpPr>
+        <p:spPr>
+          <a:xfrm flipH="1" flipV="1">
+            <a:off x="2397892" y="682087"/>
+            <a:ext cx="469466" cy="376424"/>
+          </a:xfrm>
+          <a:prstGeom prst="straightConnector1">
+            <a:avLst/>
+          </a:prstGeom>
+          <a:ln w="57150">
+            <a:solidFill>
+              <a:srgbClr val="FF0000"/>
+            </a:solidFill>
+            <a:tailEnd type="triangle" w="med" len="med"/>
+          </a:ln>
+        </p:spPr>
+        <p:style>
+          <a:lnRef idx="1">
+            <a:schemeClr val="accent1"/>
+          </a:lnRef>
+          <a:fillRef idx="0">
+            <a:schemeClr val="accent1"/>
+          </a:fillRef>
+          <a:effectRef idx="0">
+            <a:schemeClr val="accent1"/>
+          </a:effectRef>
+          <a:fontRef idx="minor">
+            <a:schemeClr val="tx1"/>
+          </a:fontRef>
+        </p:style>
+      </p:cxnSp>
+      <p:cxnSp>
+        <p:nvCxnSpPr>
+          <p:cNvPr id="166" name="Straight Connector 165">
+            <a:extLst>
+              <a:ext uri="{FF2B5EF4-FFF2-40B4-BE49-F238E27FC236}">
+                <a16:creationId xmlns:a16="http://schemas.microsoft.com/office/drawing/2014/main" id="{6221310A-4B5C-4BD9-B5B5-BED4BEE02A0B}"/>
+              </a:ext>
+            </a:extLst>
+          </p:cNvPr>
+          <p:cNvCxnSpPr>
+            <a:cxnSpLocks/>
+          </p:cNvCxnSpPr>
+          <p:nvPr/>
+        </p:nvCxnSpPr>
+        <p:spPr>
+          <a:xfrm flipH="1" flipV="1">
+            <a:off x="3233854" y="4077900"/>
+            <a:ext cx="555690" cy="640329"/>
+          </a:xfrm>
+          <a:prstGeom prst="line">
+            <a:avLst/>
+          </a:prstGeom>
+          <a:ln w="57150">
+            <a:solidFill>
+              <a:srgbClr val="00B0F0"/>
+            </a:solidFill>
+            <a:prstDash val="sysDash"/>
+          </a:ln>
+        </p:spPr>
+        <p:style>
+          <a:lnRef idx="1">
+            <a:schemeClr val="accent1"/>
+          </a:lnRef>
+          <a:fillRef idx="0">
+            <a:schemeClr val="accent1"/>
+          </a:fillRef>
+          <a:effectRef idx="0">
+            <a:schemeClr val="accent1"/>
+          </a:effectRef>
+          <a:fontRef idx="minor">
+            <a:schemeClr val="tx1"/>
+          </a:fontRef>
+        </p:style>
+      </p:cxnSp>
+      <p:cxnSp>
+        <p:nvCxnSpPr>
+          <p:cNvPr id="168" name="Straight Arrow Connector 167">
+            <a:extLst>
+              <a:ext uri="{FF2B5EF4-FFF2-40B4-BE49-F238E27FC236}">
+                <a16:creationId xmlns:a16="http://schemas.microsoft.com/office/drawing/2014/main" id="{D1CB8119-2303-4B05-A66B-E311F4705944}"/>
+              </a:ext>
+            </a:extLst>
+          </p:cNvPr>
+          <p:cNvCxnSpPr>
+            <a:cxnSpLocks/>
+          </p:cNvCxnSpPr>
+          <p:nvPr/>
+        </p:nvCxnSpPr>
+        <p:spPr>
+          <a:xfrm flipH="1" flipV="1">
+            <a:off x="6329834" y="1057943"/>
+            <a:ext cx="306750" cy="304662"/>
+          </a:xfrm>
+          <a:prstGeom prst="straightConnector1">
+            <a:avLst/>
+          </a:prstGeom>
+          <a:ln w="57150">
+            <a:solidFill>
+              <a:srgbClr val="FF0000"/>
+            </a:solidFill>
+            <a:tailEnd type="triangle" w="med" len="med"/>
+          </a:ln>
+        </p:spPr>
+        <p:style>
+          <a:lnRef idx="1">
+            <a:schemeClr val="accent1"/>
+          </a:lnRef>
+          <a:fillRef idx="0">
+            <a:schemeClr val="accent1"/>
+          </a:fillRef>
+          <a:effectRef idx="0">
+            <a:schemeClr val="accent1"/>
+          </a:effectRef>
+          <a:fontRef idx="minor">
+            <a:schemeClr val="tx1"/>
+          </a:fontRef>
+        </p:style>
+      </p:cxnSp>
+      <p:cxnSp>
+        <p:nvCxnSpPr>
+          <p:cNvPr id="169" name="Straight Arrow Connector 168">
+            <a:extLst>
+              <a:ext uri="{FF2B5EF4-FFF2-40B4-BE49-F238E27FC236}">
+                <a16:creationId xmlns:a16="http://schemas.microsoft.com/office/drawing/2014/main" id="{8A73F71B-999E-4BC8-8CB5-84F7D726D53D}"/>
+              </a:ext>
+            </a:extLst>
+          </p:cNvPr>
+          <p:cNvCxnSpPr>
+            <a:cxnSpLocks/>
+          </p:cNvCxnSpPr>
+          <p:nvPr/>
+        </p:nvCxnSpPr>
+        <p:spPr>
+          <a:xfrm flipV="1">
+            <a:off x="7495230" y="3391207"/>
+            <a:ext cx="466741" cy="249662"/>
+          </a:xfrm>
+          <a:prstGeom prst="straightConnector1">
+            <a:avLst/>
+          </a:prstGeom>
+          <a:ln w="57150">
+            <a:solidFill>
+              <a:srgbClr val="FF0000"/>
+            </a:solidFill>
+            <a:tailEnd type="triangle" w="med" len="med"/>
+          </a:ln>
+        </p:spPr>
+        <p:style>
+          <a:lnRef idx="1">
+            <a:schemeClr val="accent1"/>
+          </a:lnRef>
+          <a:fillRef idx="0">
+            <a:schemeClr val="accent1"/>
+          </a:fillRef>
+          <a:effectRef idx="0">
+            <a:schemeClr val="accent1"/>
+          </a:effectRef>
+          <a:fontRef idx="minor">
+            <a:schemeClr val="tx1"/>
+          </a:fontRef>
+        </p:style>
+      </p:cxnSp>
+      <p:sp>
+        <p:nvSpPr>
+          <p:cNvPr id="178" name="Rectangle 177">
+            <a:extLst>
+              <a:ext uri="{FF2B5EF4-FFF2-40B4-BE49-F238E27FC236}">
+                <a16:creationId xmlns:a16="http://schemas.microsoft.com/office/drawing/2014/main" id="{C43DBCDD-A308-49E6-AA36-3731FE768F1E}"/>
+              </a:ext>
+            </a:extLst>
+          </p:cNvPr>
+          <p:cNvSpPr/>
+          <p:nvPr/>
+        </p:nvSpPr>
+        <p:spPr>
+          <a:xfrm>
+            <a:off x="8674671" y="7476320"/>
+            <a:ext cx="339267" cy="339047"/>
+          </a:xfrm>
+          <a:prstGeom prst="rect">
+            <a:avLst/>
+          </a:prstGeom>
+          <a:solidFill>
+            <a:srgbClr val="FF0000"/>
+          </a:solidFill>
+          <a:ln w="38100">
+            <a:solidFill>
+              <a:schemeClr val="tx1"/>
+            </a:solidFill>
+          </a:ln>
+        </p:spPr>
+        <p:style>
+          <a:lnRef idx="2">
+            <a:schemeClr val="accent1">
+              <a:shade val="50000"/>
+            </a:schemeClr>
+          </a:lnRef>
+          <a:fillRef idx="1">
+            <a:schemeClr val="accent1"/>
+          </a:fillRef>
+          <a:effectRef idx="0">
+            <a:schemeClr val="accent1"/>
+          </a:effectRef>
+          <a:fontRef idx="minor">
+            <a:schemeClr val="lt1"/>
+          </a:fontRef>
+        </p:style>
+        <p:txBody>
+          <a:bodyPr rtlCol="0" anchor="ctr"/>
+          <a:lstStyle/>
+          <a:p>
+            <a:pPr algn="ctr"/>
+            <a:endParaRPr lang="en-US"/>
+          </a:p>
+        </p:txBody>
+      </p:sp>
+      <p:sp>
+        <p:nvSpPr>
+          <p:cNvPr id="179" name="Rectangle 178">
+            <a:extLst>
+              <a:ext uri="{FF2B5EF4-FFF2-40B4-BE49-F238E27FC236}">
+                <a16:creationId xmlns:a16="http://schemas.microsoft.com/office/drawing/2014/main" id="{81E02D9A-7C62-47B1-9C3A-6536E92F6DA4}"/>
+              </a:ext>
+            </a:extLst>
+          </p:cNvPr>
+          <p:cNvSpPr/>
+          <p:nvPr/>
+        </p:nvSpPr>
+        <p:spPr>
+          <a:xfrm>
+            <a:off x="8674670" y="8083560"/>
+            <a:ext cx="339267" cy="339047"/>
+          </a:xfrm>
+          <a:prstGeom prst="rect">
+            <a:avLst/>
+          </a:prstGeom>
+          <a:solidFill>
+            <a:srgbClr val="00B0F0"/>
+          </a:solidFill>
+          <a:ln w="38100">
+            <a:solidFill>
+              <a:schemeClr val="tx1"/>
+            </a:solidFill>
+          </a:ln>
+        </p:spPr>
+        <p:style>
+          <a:lnRef idx="2">
+            <a:schemeClr val="accent1">
+              <a:shade val="50000"/>
+            </a:schemeClr>
+          </a:lnRef>
+          <a:fillRef idx="1">
+            <a:schemeClr val="accent1"/>
+          </a:fillRef>
+          <a:effectRef idx="0">
+            <a:schemeClr val="accent1"/>
+          </a:effectRef>
+          <a:fontRef idx="minor">
+            <a:schemeClr val="lt1"/>
+          </a:fontRef>
+        </p:style>
+        <p:txBody>
+          <a:bodyPr rtlCol="0" anchor="ctr"/>
+          <a:lstStyle/>
+          <a:p>
+            <a:pPr algn="ctr"/>
+            <a:endParaRPr lang="en-US"/>
+          </a:p>
+        </p:txBody>
+      </p:sp>
+      <p:sp>
+        <p:nvSpPr>
+          <p:cNvPr id="180" name="TextBox 179">
+            <a:extLst>
+              <a:ext uri="{FF2B5EF4-FFF2-40B4-BE49-F238E27FC236}">
+                <a16:creationId xmlns:a16="http://schemas.microsoft.com/office/drawing/2014/main" id="{C2265A91-9C2D-4D8B-8DDF-BEF5F578E06E}"/>
+              </a:ext>
+            </a:extLst>
+          </p:cNvPr>
+          <p:cNvSpPr txBox="1"/>
+          <p:nvPr/>
+        </p:nvSpPr>
+        <p:spPr>
+          <a:xfrm>
+            <a:off x="9013937" y="7415010"/>
+            <a:ext cx="3084341" cy="461665"/>
+          </a:xfrm>
+          <a:prstGeom prst="rect">
+            <a:avLst/>
+          </a:prstGeom>
+          <a:noFill/>
+        </p:spPr>
+        <p:txBody>
+          <a:bodyPr wrap="square" rtlCol="0">
+            <a:spAutoFit/>
+          </a:bodyPr>
+          <a:lstStyle/>
+          <a:p>
+            <a:r>
+              <a:rPr lang="en-US" sz="2400" dirty="0"/>
+              <a:t>Fluid Leaving the LEDs</a:t>
+            </a:r>
+          </a:p>
+        </p:txBody>
+      </p:sp>
+      <p:sp>
+        <p:nvSpPr>
+          <p:cNvPr id="181" name="TextBox 180">
+            <a:extLst>
+              <a:ext uri="{FF2B5EF4-FFF2-40B4-BE49-F238E27FC236}">
+                <a16:creationId xmlns:a16="http://schemas.microsoft.com/office/drawing/2014/main" id="{8FD247E1-D3E5-4188-A576-E17C35E7AF7E}"/>
+              </a:ext>
+            </a:extLst>
+          </p:cNvPr>
+          <p:cNvSpPr txBox="1"/>
+          <p:nvPr/>
+        </p:nvSpPr>
+        <p:spPr>
+          <a:xfrm>
+            <a:off x="9013937" y="7973085"/>
+            <a:ext cx="3084337" cy="461665"/>
+          </a:xfrm>
+          <a:prstGeom prst="rect">
+            <a:avLst/>
+          </a:prstGeom>
+          <a:noFill/>
+        </p:spPr>
+        <p:txBody>
+          <a:bodyPr wrap="square" rtlCol="0">
+            <a:spAutoFit/>
+          </a:bodyPr>
+          <a:lstStyle/>
+          <a:p>
+            <a:r>
+              <a:rPr lang="en-US" sz="2400" dirty="0"/>
+              <a:t>Fluid Entering the LEDs</a:t>
+            </a:r>
+          </a:p>
+        </p:txBody>
+      </p:sp>
+      <p:sp>
+        <p:nvSpPr>
+          <p:cNvPr id="182" name="TextBox 181">
+            <a:extLst>
+              <a:ext uri="{FF2B5EF4-FFF2-40B4-BE49-F238E27FC236}">
+                <a16:creationId xmlns:a16="http://schemas.microsoft.com/office/drawing/2014/main" id="{03D9513D-C69C-4AAF-9772-EC8D915B6944}"/>
+              </a:ext>
+            </a:extLst>
+          </p:cNvPr>
+          <p:cNvSpPr txBox="1"/>
+          <p:nvPr/>
+        </p:nvSpPr>
+        <p:spPr>
+          <a:xfrm>
+            <a:off x="803520" y="118516"/>
+            <a:ext cx="3084341" cy="646331"/>
+          </a:xfrm>
+          <a:prstGeom prst="rect">
+            <a:avLst/>
+          </a:prstGeom>
+          <a:noFill/>
+        </p:spPr>
+        <p:txBody>
+          <a:bodyPr wrap="square" rtlCol="0">
+            <a:spAutoFit/>
+          </a:bodyPr>
+          <a:lstStyle/>
+          <a:p>
+            <a:r>
+              <a:rPr lang="en-US" b="1" dirty="0"/>
+              <a:t>Heated Fluid </a:t>
+            </a:r>
+          </a:p>
+          <a:p>
+            <a:r>
+              <a:rPr lang="en-US" b="1" dirty="0"/>
+              <a:t>To Radiator</a:t>
+            </a:r>
+          </a:p>
+        </p:txBody>
+      </p:sp>
+      <p:sp>
+        <p:nvSpPr>
+          <p:cNvPr id="183" name="TextBox 182">
+            <a:extLst>
+              <a:ext uri="{FF2B5EF4-FFF2-40B4-BE49-F238E27FC236}">
+                <a16:creationId xmlns:a16="http://schemas.microsoft.com/office/drawing/2014/main" id="{A1D0D39F-3DEF-494A-83BE-417D7F747E52}"/>
+              </a:ext>
+            </a:extLst>
+          </p:cNvPr>
+          <p:cNvSpPr txBox="1"/>
+          <p:nvPr/>
+        </p:nvSpPr>
+        <p:spPr>
+          <a:xfrm>
+            <a:off x="864580" y="7139741"/>
+            <a:ext cx="3084341" cy="646331"/>
+          </a:xfrm>
+          <a:prstGeom prst="rect">
+            <a:avLst/>
+          </a:prstGeom>
+          <a:noFill/>
+        </p:spPr>
+        <p:txBody>
+          <a:bodyPr wrap="square" rtlCol="0">
+            <a:spAutoFit/>
+          </a:bodyPr>
+          <a:lstStyle/>
+          <a:p>
+            <a:r>
+              <a:rPr lang="en-US" b="1" dirty="0"/>
+              <a:t>Cooled Fluid</a:t>
+            </a:r>
+          </a:p>
+          <a:p>
+            <a:r>
+              <a:rPr lang="en-US" b="1" dirty="0"/>
+              <a:t>To LEDs</a:t>
+            </a:r>
+          </a:p>
+        </p:txBody>
+      </p:sp>
     </p:spTree>
     <p:extLst>
       <p:ext uri="{BB962C8B-B14F-4D97-AF65-F5344CB8AC3E}">
-        <p14:creationId xmlns:p14="http://schemas.microsoft.com/office/powerpoint/2010/main" val="2307381036"/>
+        <p14:creationId xmlns:p14="http://schemas.microsoft.com/office/powerpoint/2010/main" val="454722824"/>
       </p:ext>
     </p:extLst>
   </p:cSld>

</xml_diff>